<commit_message>
Add gif of signal
</commit_message>
<xml_diff>
--- a/figures.pptx
+++ b/figures.pptx
@@ -2,18 +2,29 @@
 <file path=ppt/presentation.xml><?xml version="1.0" encoding="utf-8"?>
 <p:presentation xmlns:a="http://schemas.openxmlformats.org/drawingml/2006/main" xmlns:r="http://schemas.openxmlformats.org/officeDocument/2006/relationships" xmlns:p="http://schemas.openxmlformats.org/presentationml/2006/main" saveSubsetFonts="1">
   <p:sldMasterIdLst>
-    <p:sldMasterId id="2147483648" r:id="rId1"/>
+    <p:sldMasterId id="2147483660" r:id="rId1"/>
   </p:sldMasterIdLst>
   <p:sldIdLst>
     <p:sldId id="256" r:id="rId2"/>
+    <p:sldId id="257" r:id="rId3"/>
+    <p:sldId id="258" r:id="rId4"/>
+    <p:sldId id="263" r:id="rId5"/>
+    <p:sldId id="259" r:id="rId6"/>
+    <p:sldId id="262" r:id="rId7"/>
+    <p:sldId id="260" r:id="rId8"/>
+    <p:sldId id="261" r:id="rId9"/>
+    <p:sldId id="264" r:id="rId10"/>
+    <p:sldId id="265" r:id="rId11"/>
+    <p:sldId id="267" r:id="rId12"/>
+    <p:sldId id="266" r:id="rId13"/>
   </p:sldIdLst>
-  <p:sldSz cx="12192000" cy="6858000"/>
+  <p:sldSz cx="6858000" cy="6858000"/>
   <p:notesSz cx="6858000" cy="9144000"/>
   <p:defaultTextStyle>
     <a:defPPr>
       <a:defRPr lang="en-US"/>
     </a:defPPr>
-    <a:lvl1pPr marL="0" algn="l" defTabSz="914400" rtl="0" eaLnBrk="1" latinLnBrk="0" hangingPunct="1">
+    <a:lvl1pPr marL="0" algn="l" defTabSz="457200" rtl="0" eaLnBrk="1" latinLnBrk="0" hangingPunct="1">
       <a:defRPr sz="1800" kern="1200">
         <a:solidFill>
           <a:schemeClr val="tx1"/>
@@ -23,7 +34,7 @@
         <a:cs typeface="+mn-cs"/>
       </a:defRPr>
     </a:lvl1pPr>
-    <a:lvl2pPr marL="457200" algn="l" defTabSz="914400" rtl="0" eaLnBrk="1" latinLnBrk="0" hangingPunct="1">
+    <a:lvl2pPr marL="457200" algn="l" defTabSz="457200" rtl="0" eaLnBrk="1" latinLnBrk="0" hangingPunct="1">
       <a:defRPr sz="1800" kern="1200">
         <a:solidFill>
           <a:schemeClr val="tx1"/>
@@ -33,7 +44,7 @@
         <a:cs typeface="+mn-cs"/>
       </a:defRPr>
     </a:lvl2pPr>
-    <a:lvl3pPr marL="914400" algn="l" defTabSz="914400" rtl="0" eaLnBrk="1" latinLnBrk="0" hangingPunct="1">
+    <a:lvl3pPr marL="914400" algn="l" defTabSz="457200" rtl="0" eaLnBrk="1" latinLnBrk="0" hangingPunct="1">
       <a:defRPr sz="1800" kern="1200">
         <a:solidFill>
           <a:schemeClr val="tx1"/>
@@ -43,7 +54,7 @@
         <a:cs typeface="+mn-cs"/>
       </a:defRPr>
     </a:lvl3pPr>
-    <a:lvl4pPr marL="1371600" algn="l" defTabSz="914400" rtl="0" eaLnBrk="1" latinLnBrk="0" hangingPunct="1">
+    <a:lvl4pPr marL="1371600" algn="l" defTabSz="457200" rtl="0" eaLnBrk="1" latinLnBrk="0" hangingPunct="1">
       <a:defRPr sz="1800" kern="1200">
         <a:solidFill>
           <a:schemeClr val="tx1"/>
@@ -53,7 +64,7 @@
         <a:cs typeface="+mn-cs"/>
       </a:defRPr>
     </a:lvl4pPr>
-    <a:lvl5pPr marL="1828800" algn="l" defTabSz="914400" rtl="0" eaLnBrk="1" latinLnBrk="0" hangingPunct="1">
+    <a:lvl5pPr marL="1828800" algn="l" defTabSz="457200" rtl="0" eaLnBrk="1" latinLnBrk="0" hangingPunct="1">
       <a:defRPr sz="1800" kern="1200">
         <a:solidFill>
           <a:schemeClr val="tx1"/>
@@ -63,7 +74,7 @@
         <a:cs typeface="+mn-cs"/>
       </a:defRPr>
     </a:lvl5pPr>
-    <a:lvl6pPr marL="2286000" algn="l" defTabSz="914400" rtl="0" eaLnBrk="1" latinLnBrk="0" hangingPunct="1">
+    <a:lvl6pPr marL="2286000" algn="l" defTabSz="457200" rtl="0" eaLnBrk="1" latinLnBrk="0" hangingPunct="1">
       <a:defRPr sz="1800" kern="1200">
         <a:solidFill>
           <a:schemeClr val="tx1"/>
@@ -73,7 +84,7 @@
         <a:cs typeface="+mn-cs"/>
       </a:defRPr>
     </a:lvl6pPr>
-    <a:lvl7pPr marL="2743200" algn="l" defTabSz="914400" rtl="0" eaLnBrk="1" latinLnBrk="0" hangingPunct="1">
+    <a:lvl7pPr marL="2743200" algn="l" defTabSz="457200" rtl="0" eaLnBrk="1" latinLnBrk="0" hangingPunct="1">
       <a:defRPr sz="1800" kern="1200">
         <a:solidFill>
           <a:schemeClr val="tx1"/>
@@ -83,7 +94,7 @@
         <a:cs typeface="+mn-cs"/>
       </a:defRPr>
     </a:lvl7pPr>
-    <a:lvl8pPr marL="3200400" algn="l" defTabSz="914400" rtl="0" eaLnBrk="1" latinLnBrk="0" hangingPunct="1">
+    <a:lvl8pPr marL="3200400" algn="l" defTabSz="457200" rtl="0" eaLnBrk="1" latinLnBrk="0" hangingPunct="1">
       <a:defRPr sz="1800" kern="1200">
         <a:solidFill>
           <a:schemeClr val="tx1"/>
@@ -93,7 +104,7 @@
         <a:cs typeface="+mn-cs"/>
       </a:defRPr>
     </a:lvl8pPr>
-    <a:lvl9pPr marL="3657600" algn="l" defTabSz="914400" rtl="0" eaLnBrk="1" latinLnBrk="0" hangingPunct="1">
+    <a:lvl9pPr marL="3657600" algn="l" defTabSz="457200" rtl="0" eaLnBrk="1" latinLnBrk="0" hangingPunct="1">
       <a:defRPr sz="1800" kern="1200">
         <a:solidFill>
           <a:schemeClr val="tx1"/>
@@ -104,6 +115,11 @@
       </a:defRPr>
     </a:lvl9pPr>
   </p:defaultTextStyle>
+  <p:extLst>
+    <p:ext uri="{EFAFB233-063F-42B5-8137-9DF3F51BA10A}">
+      <p15:sldGuideLst xmlns:p15="http://schemas.microsoft.com/office/powerpoint/2012/main"/>
+    </p:ext>
+  </p:extLst>
 </p:presentation>
 </file>
 
@@ -126,13 +142,7 @@
       </p:grpSpPr>
       <p:sp>
         <p:nvSpPr>
-          <p:cNvPr id="2" name="Title 1">
-            <a:extLst>
-              <a:ext uri="{FF2B5EF4-FFF2-40B4-BE49-F238E27FC236}">
-                <a16:creationId xmlns:a16="http://schemas.microsoft.com/office/drawing/2014/main" id="{C24E46CC-C14A-9EDD-C58F-93912098F331}"/>
-              </a:ext>
-            </a:extLst>
-          </p:cNvPr>
+          <p:cNvPr id="2" name="Title 1"/>
           <p:cNvSpPr>
             <a:spLocks noGrp="1"/>
           </p:cNvSpPr>
@@ -142,15 +152,15 @@
         </p:nvSpPr>
         <p:spPr>
           <a:xfrm>
-            <a:off x="1524000" y="1122363"/>
-            <a:ext cx="9144000" cy="2387600"/>
+            <a:off x="514350" y="1122363"/>
+            <a:ext cx="5829300" cy="2387600"/>
           </a:xfrm>
         </p:spPr>
         <p:txBody>
           <a:bodyPr anchor="b"/>
           <a:lstStyle>
             <a:lvl1pPr algn="ctr">
-              <a:defRPr sz="6000"/>
+              <a:defRPr sz="4500"/>
             </a:lvl1pPr>
           </a:lstStyle>
           <a:p>
@@ -158,18 +168,13 @@
               <a:rPr lang="en-US"/>
               <a:t>Click to edit Master title style</a:t>
             </a:r>
-          </a:p>
-        </p:txBody>
-      </p:sp>
-      <p:sp>
-        <p:nvSpPr>
-          <p:cNvPr id="3" name="Subtitle 2">
-            <a:extLst>
-              <a:ext uri="{FF2B5EF4-FFF2-40B4-BE49-F238E27FC236}">
-                <a16:creationId xmlns:a16="http://schemas.microsoft.com/office/drawing/2014/main" id="{C696D160-6F03-8593-38A8-9FE4C34DF930}"/>
-              </a:ext>
-            </a:extLst>
-          </p:cNvPr>
+            <a:endParaRPr lang="en-US" dirty="0"/>
+          </a:p>
+        </p:txBody>
+      </p:sp>
+      <p:sp>
+        <p:nvSpPr>
+          <p:cNvPr id="3" name="Subtitle 2"/>
           <p:cNvSpPr>
             <a:spLocks noGrp="1"/>
           </p:cNvSpPr>
@@ -179,8 +184,8 @@
         </p:nvSpPr>
         <p:spPr>
           <a:xfrm>
-            <a:off x="1524000" y="3602038"/>
-            <a:ext cx="9144000" cy="1655762"/>
+            <a:off x="857250" y="3602038"/>
+            <a:ext cx="5143500" cy="1655762"/>
           </a:xfrm>
         </p:spPr>
         <p:txBody>
@@ -188,39 +193,39 @@
           <a:lstStyle>
             <a:lvl1pPr marL="0" indent="0" algn="ctr">
               <a:buNone/>
-              <a:defRPr sz="2400"/>
+              <a:defRPr sz="1800"/>
             </a:lvl1pPr>
-            <a:lvl2pPr marL="457200" indent="0" algn="ctr">
-              <a:buNone/>
-              <a:defRPr sz="2000"/>
+            <a:lvl2pPr marL="342900" indent="0" algn="ctr">
+              <a:buNone/>
+              <a:defRPr sz="1500"/>
             </a:lvl2pPr>
-            <a:lvl3pPr marL="914400" indent="0" algn="ctr">
-              <a:buNone/>
-              <a:defRPr sz="1800"/>
+            <a:lvl3pPr marL="685800" indent="0" algn="ctr">
+              <a:buNone/>
+              <a:defRPr sz="1350"/>
             </a:lvl3pPr>
-            <a:lvl4pPr marL="1371600" indent="0" algn="ctr">
-              <a:buNone/>
-              <a:defRPr sz="1600"/>
+            <a:lvl4pPr marL="1028700" indent="0" algn="ctr">
+              <a:buNone/>
+              <a:defRPr sz="1200"/>
             </a:lvl4pPr>
-            <a:lvl5pPr marL="1828800" indent="0" algn="ctr">
-              <a:buNone/>
-              <a:defRPr sz="1600"/>
+            <a:lvl5pPr marL="1371600" indent="0" algn="ctr">
+              <a:buNone/>
+              <a:defRPr sz="1200"/>
             </a:lvl5pPr>
-            <a:lvl6pPr marL="2286000" indent="0" algn="ctr">
-              <a:buNone/>
-              <a:defRPr sz="1600"/>
+            <a:lvl6pPr marL="1714500" indent="0" algn="ctr">
+              <a:buNone/>
+              <a:defRPr sz="1200"/>
             </a:lvl6pPr>
-            <a:lvl7pPr marL="2743200" indent="0" algn="ctr">
-              <a:buNone/>
-              <a:defRPr sz="1600"/>
+            <a:lvl7pPr marL="2057400" indent="0" algn="ctr">
+              <a:buNone/>
+              <a:defRPr sz="1200"/>
             </a:lvl7pPr>
-            <a:lvl8pPr marL="3200400" indent="0" algn="ctr">
-              <a:buNone/>
-              <a:defRPr sz="1600"/>
+            <a:lvl8pPr marL="2400300" indent="0" algn="ctr">
+              <a:buNone/>
+              <a:defRPr sz="1200"/>
             </a:lvl8pPr>
-            <a:lvl9pPr marL="3657600" indent="0" algn="ctr">
-              <a:buNone/>
-              <a:defRPr sz="1600"/>
+            <a:lvl9pPr marL="2743200" indent="0" algn="ctr">
+              <a:buNone/>
+              <a:defRPr sz="1200"/>
             </a:lvl9pPr>
           </a:lstStyle>
           <a:p>
@@ -228,18 +233,13 @@
               <a:rPr lang="en-US"/>
               <a:t>Click to edit Master subtitle style</a:t>
             </a:r>
-          </a:p>
-        </p:txBody>
-      </p:sp>
-      <p:sp>
-        <p:nvSpPr>
-          <p:cNvPr id="4" name="Date Placeholder 3">
-            <a:extLst>
-              <a:ext uri="{FF2B5EF4-FFF2-40B4-BE49-F238E27FC236}">
-                <a16:creationId xmlns:a16="http://schemas.microsoft.com/office/drawing/2014/main" id="{D9B9B4BD-34EA-ED2A-8DCE-3EB7FA97D301}"/>
-              </a:ext>
-            </a:extLst>
-          </p:cNvPr>
+            <a:endParaRPr lang="en-US" dirty="0"/>
+          </a:p>
+        </p:txBody>
+      </p:sp>
+      <p:sp>
+        <p:nvSpPr>
+          <p:cNvPr id="4" name="Date Placeholder 3"/>
           <p:cNvSpPr>
             <a:spLocks noGrp="1"/>
           </p:cNvSpPr>
@@ -254,7 +254,7 @@
           <a:p>
             <a:fld id="{83F41DB9-FD7B-43C3-B63D-882497A25A78}" type="datetimeFigureOut">
               <a:rPr lang="en-US" smtClean="0"/>
-              <a:t>7/13/2023</a:t>
+              <a:t>8/11/2023</a:t>
             </a:fld>
             <a:endParaRPr lang="en-US"/>
           </a:p>
@@ -262,13 +262,7 @@
       </p:sp>
       <p:sp>
         <p:nvSpPr>
-          <p:cNvPr id="5" name="Footer Placeholder 4">
-            <a:extLst>
-              <a:ext uri="{FF2B5EF4-FFF2-40B4-BE49-F238E27FC236}">
-                <a16:creationId xmlns:a16="http://schemas.microsoft.com/office/drawing/2014/main" id="{13B3C5E6-5441-3D3C-CDBD-BFFD90846703}"/>
-              </a:ext>
-            </a:extLst>
-          </p:cNvPr>
+          <p:cNvPr id="5" name="Footer Placeholder 4"/>
           <p:cNvSpPr>
             <a:spLocks noGrp="1"/>
           </p:cNvSpPr>
@@ -287,13 +281,7 @@
       </p:sp>
       <p:sp>
         <p:nvSpPr>
-          <p:cNvPr id="6" name="Slide Number Placeholder 5">
-            <a:extLst>
-              <a:ext uri="{FF2B5EF4-FFF2-40B4-BE49-F238E27FC236}">
-                <a16:creationId xmlns:a16="http://schemas.microsoft.com/office/drawing/2014/main" id="{C313A594-1C0E-BF74-E3DE-E50869A53E90}"/>
-              </a:ext>
-            </a:extLst>
-          </p:cNvPr>
+          <p:cNvPr id="6" name="Slide Number Placeholder 5"/>
           <p:cNvSpPr>
             <a:spLocks noGrp="1"/>
           </p:cNvSpPr>
@@ -317,7 +305,7 @@
     </p:spTree>
     <p:extLst>
       <p:ext uri="{BB962C8B-B14F-4D97-AF65-F5344CB8AC3E}">
-        <p14:creationId xmlns:p14="http://schemas.microsoft.com/office/powerpoint/2010/main" val="4246437142"/>
+        <p14:creationId xmlns:p14="http://schemas.microsoft.com/office/powerpoint/2010/main" val="486312902"/>
       </p:ext>
     </p:extLst>
   </p:cSld>
@@ -346,13 +334,7 @@
       </p:grpSpPr>
       <p:sp>
         <p:nvSpPr>
-          <p:cNvPr id="2" name="Title 1">
-            <a:extLst>
-              <a:ext uri="{FF2B5EF4-FFF2-40B4-BE49-F238E27FC236}">
-                <a16:creationId xmlns:a16="http://schemas.microsoft.com/office/drawing/2014/main" id="{36350796-4797-86BB-2B23-1785FDA4BB60}"/>
-              </a:ext>
-            </a:extLst>
-          </p:cNvPr>
+          <p:cNvPr id="2" name="Title 1"/>
           <p:cNvSpPr>
             <a:spLocks noGrp="1"/>
           </p:cNvSpPr>
@@ -369,18 +351,13 @@
               <a:rPr lang="en-US"/>
               <a:t>Click to edit Master title style</a:t>
             </a:r>
-          </a:p>
-        </p:txBody>
-      </p:sp>
-      <p:sp>
-        <p:nvSpPr>
-          <p:cNvPr id="3" name="Vertical Text Placeholder 2">
-            <a:extLst>
-              <a:ext uri="{FF2B5EF4-FFF2-40B4-BE49-F238E27FC236}">
-                <a16:creationId xmlns:a16="http://schemas.microsoft.com/office/drawing/2014/main" id="{710D9AC3-38F6-0BBF-6410-6E9C6DC10312}"/>
-              </a:ext>
-            </a:extLst>
-          </p:cNvPr>
+            <a:endParaRPr lang="en-US" dirty="0"/>
+          </a:p>
+        </p:txBody>
+      </p:sp>
+      <p:sp>
+        <p:nvSpPr>
+          <p:cNvPr id="3" name="Vertical Text Placeholder 2"/>
           <p:cNvSpPr>
             <a:spLocks noGrp="1"/>
           </p:cNvSpPr>
@@ -426,18 +403,13 @@
               <a:rPr lang="en-US"/>
               <a:t>Fifth level</a:t>
             </a:r>
-          </a:p>
-        </p:txBody>
-      </p:sp>
-      <p:sp>
-        <p:nvSpPr>
-          <p:cNvPr id="4" name="Date Placeholder 3">
-            <a:extLst>
-              <a:ext uri="{FF2B5EF4-FFF2-40B4-BE49-F238E27FC236}">
-                <a16:creationId xmlns:a16="http://schemas.microsoft.com/office/drawing/2014/main" id="{10DA898C-5152-816B-B97D-9FB8FEC47C47}"/>
-              </a:ext>
-            </a:extLst>
-          </p:cNvPr>
+            <a:endParaRPr lang="en-US" dirty="0"/>
+          </a:p>
+        </p:txBody>
+      </p:sp>
+      <p:sp>
+        <p:nvSpPr>
+          <p:cNvPr id="4" name="Date Placeholder 3"/>
           <p:cNvSpPr>
             <a:spLocks noGrp="1"/>
           </p:cNvSpPr>
@@ -452,7 +424,7 @@
           <a:p>
             <a:fld id="{83F41DB9-FD7B-43C3-B63D-882497A25A78}" type="datetimeFigureOut">
               <a:rPr lang="en-US" smtClean="0"/>
-              <a:t>7/13/2023</a:t>
+              <a:t>8/11/2023</a:t>
             </a:fld>
             <a:endParaRPr lang="en-US"/>
           </a:p>
@@ -460,13 +432,7 @@
       </p:sp>
       <p:sp>
         <p:nvSpPr>
-          <p:cNvPr id="5" name="Footer Placeholder 4">
-            <a:extLst>
-              <a:ext uri="{FF2B5EF4-FFF2-40B4-BE49-F238E27FC236}">
-                <a16:creationId xmlns:a16="http://schemas.microsoft.com/office/drawing/2014/main" id="{F8A249E7-9DA0-0F07-E75C-7878B2DA2804}"/>
-              </a:ext>
-            </a:extLst>
-          </p:cNvPr>
+          <p:cNvPr id="5" name="Footer Placeholder 4"/>
           <p:cNvSpPr>
             <a:spLocks noGrp="1"/>
           </p:cNvSpPr>
@@ -485,13 +451,7 @@
       </p:sp>
       <p:sp>
         <p:nvSpPr>
-          <p:cNvPr id="6" name="Slide Number Placeholder 5">
-            <a:extLst>
-              <a:ext uri="{FF2B5EF4-FFF2-40B4-BE49-F238E27FC236}">
-                <a16:creationId xmlns:a16="http://schemas.microsoft.com/office/drawing/2014/main" id="{68276978-05A8-61D0-2F78-410A3C9D9BF9}"/>
-              </a:ext>
-            </a:extLst>
-          </p:cNvPr>
+          <p:cNvPr id="6" name="Slide Number Placeholder 5"/>
           <p:cNvSpPr>
             <a:spLocks noGrp="1"/>
           </p:cNvSpPr>
@@ -515,7 +475,7 @@
     </p:spTree>
     <p:extLst>
       <p:ext uri="{BB962C8B-B14F-4D97-AF65-F5344CB8AC3E}">
-        <p14:creationId xmlns:p14="http://schemas.microsoft.com/office/powerpoint/2010/main" val="1269377622"/>
+        <p14:creationId xmlns:p14="http://schemas.microsoft.com/office/powerpoint/2010/main" val="2326490270"/>
       </p:ext>
     </p:extLst>
   </p:cSld>
@@ -544,13 +504,7 @@
       </p:grpSpPr>
       <p:sp>
         <p:nvSpPr>
-          <p:cNvPr id="2" name="Vertical Title 1">
-            <a:extLst>
-              <a:ext uri="{FF2B5EF4-FFF2-40B4-BE49-F238E27FC236}">
-                <a16:creationId xmlns:a16="http://schemas.microsoft.com/office/drawing/2014/main" id="{86115A8F-C593-79B3-78A7-074C7AA7FAF0}"/>
-              </a:ext>
-            </a:extLst>
-          </p:cNvPr>
+          <p:cNvPr id="2" name="Vertical Title 1"/>
           <p:cNvSpPr>
             <a:spLocks noGrp="1"/>
           </p:cNvSpPr>
@@ -560,8 +514,8 @@
         </p:nvSpPr>
         <p:spPr>
           <a:xfrm>
-            <a:off x="8724900" y="365125"/>
-            <a:ext cx="2628900" cy="5811838"/>
+            <a:off x="4907757" y="365125"/>
+            <a:ext cx="1478756" cy="5811838"/>
           </a:xfrm>
         </p:spPr>
         <p:txBody>
@@ -572,18 +526,13 @@
               <a:rPr lang="en-US"/>
               <a:t>Click to edit Master title style</a:t>
             </a:r>
-          </a:p>
-        </p:txBody>
-      </p:sp>
-      <p:sp>
-        <p:nvSpPr>
-          <p:cNvPr id="3" name="Vertical Text Placeholder 2">
-            <a:extLst>
-              <a:ext uri="{FF2B5EF4-FFF2-40B4-BE49-F238E27FC236}">
-                <a16:creationId xmlns:a16="http://schemas.microsoft.com/office/drawing/2014/main" id="{7EAADED4-C15C-835E-F6C8-EAFC83B04CE7}"/>
-              </a:ext>
-            </a:extLst>
-          </p:cNvPr>
+            <a:endParaRPr lang="en-US" dirty="0"/>
+          </a:p>
+        </p:txBody>
+      </p:sp>
+      <p:sp>
+        <p:nvSpPr>
+          <p:cNvPr id="3" name="Vertical Text Placeholder 2"/>
           <p:cNvSpPr>
             <a:spLocks noGrp="1"/>
           </p:cNvSpPr>
@@ -593,8 +542,8 @@
         </p:nvSpPr>
         <p:spPr>
           <a:xfrm>
-            <a:off x="838200" y="365125"/>
-            <a:ext cx="7734300" cy="5811838"/>
+            <a:off x="471488" y="365125"/>
+            <a:ext cx="4350544" cy="5811838"/>
           </a:xfrm>
         </p:spPr>
         <p:txBody>
@@ -634,18 +583,13 @@
               <a:rPr lang="en-US"/>
               <a:t>Fifth level</a:t>
             </a:r>
-          </a:p>
-        </p:txBody>
-      </p:sp>
-      <p:sp>
-        <p:nvSpPr>
-          <p:cNvPr id="4" name="Date Placeholder 3">
-            <a:extLst>
-              <a:ext uri="{FF2B5EF4-FFF2-40B4-BE49-F238E27FC236}">
-                <a16:creationId xmlns:a16="http://schemas.microsoft.com/office/drawing/2014/main" id="{3C6D7FB1-E128-3430-5B76-BB12AD4D243F}"/>
-              </a:ext>
-            </a:extLst>
-          </p:cNvPr>
+            <a:endParaRPr lang="en-US" dirty="0"/>
+          </a:p>
+        </p:txBody>
+      </p:sp>
+      <p:sp>
+        <p:nvSpPr>
+          <p:cNvPr id="4" name="Date Placeholder 3"/>
           <p:cNvSpPr>
             <a:spLocks noGrp="1"/>
           </p:cNvSpPr>
@@ -660,7 +604,7 @@
           <a:p>
             <a:fld id="{83F41DB9-FD7B-43C3-B63D-882497A25A78}" type="datetimeFigureOut">
               <a:rPr lang="en-US" smtClean="0"/>
-              <a:t>7/13/2023</a:t>
+              <a:t>8/11/2023</a:t>
             </a:fld>
             <a:endParaRPr lang="en-US"/>
           </a:p>
@@ -668,13 +612,7 @@
       </p:sp>
       <p:sp>
         <p:nvSpPr>
-          <p:cNvPr id="5" name="Footer Placeholder 4">
-            <a:extLst>
-              <a:ext uri="{FF2B5EF4-FFF2-40B4-BE49-F238E27FC236}">
-                <a16:creationId xmlns:a16="http://schemas.microsoft.com/office/drawing/2014/main" id="{220CFE1E-1EF6-4241-D375-E7CC8DDD5DA2}"/>
-              </a:ext>
-            </a:extLst>
-          </p:cNvPr>
+          <p:cNvPr id="5" name="Footer Placeholder 4"/>
           <p:cNvSpPr>
             <a:spLocks noGrp="1"/>
           </p:cNvSpPr>
@@ -693,13 +631,7 @@
       </p:sp>
       <p:sp>
         <p:nvSpPr>
-          <p:cNvPr id="6" name="Slide Number Placeholder 5">
-            <a:extLst>
-              <a:ext uri="{FF2B5EF4-FFF2-40B4-BE49-F238E27FC236}">
-                <a16:creationId xmlns:a16="http://schemas.microsoft.com/office/drawing/2014/main" id="{8F66BE9E-7074-7C16-EE81-D2D601D82968}"/>
-              </a:ext>
-            </a:extLst>
-          </p:cNvPr>
+          <p:cNvPr id="6" name="Slide Number Placeholder 5"/>
           <p:cNvSpPr>
             <a:spLocks noGrp="1"/>
           </p:cNvSpPr>
@@ -723,7 +655,7 @@
     </p:spTree>
     <p:extLst>
       <p:ext uri="{BB962C8B-B14F-4D97-AF65-F5344CB8AC3E}">
-        <p14:creationId xmlns:p14="http://schemas.microsoft.com/office/powerpoint/2010/main" val="1702977990"/>
+        <p14:creationId xmlns:p14="http://schemas.microsoft.com/office/powerpoint/2010/main" val="826443808"/>
       </p:ext>
     </p:extLst>
   </p:cSld>
@@ -752,13 +684,7 @@
       </p:grpSpPr>
       <p:sp>
         <p:nvSpPr>
-          <p:cNvPr id="2" name="Title 1">
-            <a:extLst>
-              <a:ext uri="{FF2B5EF4-FFF2-40B4-BE49-F238E27FC236}">
-                <a16:creationId xmlns:a16="http://schemas.microsoft.com/office/drawing/2014/main" id="{5A1FE19C-05B3-6C8B-01A1-99DCF977730F}"/>
-              </a:ext>
-            </a:extLst>
-          </p:cNvPr>
+          <p:cNvPr id="2" name="Title 1"/>
           <p:cNvSpPr>
             <a:spLocks noGrp="1"/>
           </p:cNvSpPr>
@@ -775,18 +701,13 @@
               <a:rPr lang="en-US"/>
               <a:t>Click to edit Master title style</a:t>
             </a:r>
-          </a:p>
-        </p:txBody>
-      </p:sp>
-      <p:sp>
-        <p:nvSpPr>
-          <p:cNvPr id="3" name="Content Placeholder 2">
-            <a:extLst>
-              <a:ext uri="{FF2B5EF4-FFF2-40B4-BE49-F238E27FC236}">
-                <a16:creationId xmlns:a16="http://schemas.microsoft.com/office/drawing/2014/main" id="{7F142EFC-4448-4161-FE55-172A75B8DDEF}"/>
-              </a:ext>
-            </a:extLst>
-          </p:cNvPr>
+            <a:endParaRPr lang="en-US" dirty="0"/>
+          </a:p>
+        </p:txBody>
+      </p:sp>
+      <p:sp>
+        <p:nvSpPr>
+          <p:cNvPr id="3" name="Content Placeholder 2"/>
           <p:cNvSpPr>
             <a:spLocks noGrp="1"/>
           </p:cNvSpPr>
@@ -832,18 +753,13 @@
               <a:rPr lang="en-US"/>
               <a:t>Fifth level</a:t>
             </a:r>
-          </a:p>
-        </p:txBody>
-      </p:sp>
-      <p:sp>
-        <p:nvSpPr>
-          <p:cNvPr id="4" name="Date Placeholder 3">
-            <a:extLst>
-              <a:ext uri="{FF2B5EF4-FFF2-40B4-BE49-F238E27FC236}">
-                <a16:creationId xmlns:a16="http://schemas.microsoft.com/office/drawing/2014/main" id="{59837CAE-A99F-F3AF-0670-6C1B3DEA2AFB}"/>
-              </a:ext>
-            </a:extLst>
-          </p:cNvPr>
+            <a:endParaRPr lang="en-US" dirty="0"/>
+          </a:p>
+        </p:txBody>
+      </p:sp>
+      <p:sp>
+        <p:nvSpPr>
+          <p:cNvPr id="4" name="Date Placeholder 3"/>
           <p:cNvSpPr>
             <a:spLocks noGrp="1"/>
           </p:cNvSpPr>
@@ -858,7 +774,7 @@
           <a:p>
             <a:fld id="{83F41DB9-FD7B-43C3-B63D-882497A25A78}" type="datetimeFigureOut">
               <a:rPr lang="en-US" smtClean="0"/>
-              <a:t>7/13/2023</a:t>
+              <a:t>8/11/2023</a:t>
             </a:fld>
             <a:endParaRPr lang="en-US"/>
           </a:p>
@@ -866,13 +782,7 @@
       </p:sp>
       <p:sp>
         <p:nvSpPr>
-          <p:cNvPr id="5" name="Footer Placeholder 4">
-            <a:extLst>
-              <a:ext uri="{FF2B5EF4-FFF2-40B4-BE49-F238E27FC236}">
-                <a16:creationId xmlns:a16="http://schemas.microsoft.com/office/drawing/2014/main" id="{B9509F1D-D0BC-6FD2-08D8-96A8FD7A3AC1}"/>
-              </a:ext>
-            </a:extLst>
-          </p:cNvPr>
+          <p:cNvPr id="5" name="Footer Placeholder 4"/>
           <p:cNvSpPr>
             <a:spLocks noGrp="1"/>
           </p:cNvSpPr>
@@ -891,13 +801,7 @@
       </p:sp>
       <p:sp>
         <p:nvSpPr>
-          <p:cNvPr id="6" name="Slide Number Placeholder 5">
-            <a:extLst>
-              <a:ext uri="{FF2B5EF4-FFF2-40B4-BE49-F238E27FC236}">
-                <a16:creationId xmlns:a16="http://schemas.microsoft.com/office/drawing/2014/main" id="{ABECCE75-C5C6-EC1C-036D-C0E8796726CC}"/>
-              </a:ext>
-            </a:extLst>
-          </p:cNvPr>
+          <p:cNvPr id="6" name="Slide Number Placeholder 5"/>
           <p:cNvSpPr>
             <a:spLocks noGrp="1"/>
           </p:cNvSpPr>
@@ -921,7 +825,7 @@
     </p:spTree>
     <p:extLst>
       <p:ext uri="{BB962C8B-B14F-4D97-AF65-F5344CB8AC3E}">
-        <p14:creationId xmlns:p14="http://schemas.microsoft.com/office/powerpoint/2010/main" val="1688696765"/>
+        <p14:creationId xmlns:p14="http://schemas.microsoft.com/office/powerpoint/2010/main" val="3983820762"/>
       </p:ext>
     </p:extLst>
   </p:cSld>
@@ -950,13 +854,7 @@
       </p:grpSpPr>
       <p:sp>
         <p:nvSpPr>
-          <p:cNvPr id="2" name="Title 1">
-            <a:extLst>
-              <a:ext uri="{FF2B5EF4-FFF2-40B4-BE49-F238E27FC236}">
-                <a16:creationId xmlns:a16="http://schemas.microsoft.com/office/drawing/2014/main" id="{EB895DD0-6DB6-6B65-665D-4CAEBD293C3E}"/>
-              </a:ext>
-            </a:extLst>
-          </p:cNvPr>
+          <p:cNvPr id="2" name="Title 1"/>
           <p:cNvSpPr>
             <a:spLocks noGrp="1"/>
           </p:cNvSpPr>
@@ -966,15 +864,15 @@
         </p:nvSpPr>
         <p:spPr>
           <a:xfrm>
-            <a:off x="831850" y="1709738"/>
-            <a:ext cx="10515600" cy="2852737"/>
+            <a:off x="467916" y="1709740"/>
+            <a:ext cx="5915025" cy="2852737"/>
           </a:xfrm>
         </p:spPr>
         <p:txBody>
           <a:bodyPr anchor="b"/>
           <a:lstStyle>
             <a:lvl1pPr>
-              <a:defRPr sz="6000"/>
+              <a:defRPr sz="4500"/>
             </a:lvl1pPr>
           </a:lstStyle>
           <a:p>
@@ -982,18 +880,13 @@
               <a:rPr lang="en-US"/>
               <a:t>Click to edit Master title style</a:t>
             </a:r>
-          </a:p>
-        </p:txBody>
-      </p:sp>
-      <p:sp>
-        <p:nvSpPr>
-          <p:cNvPr id="3" name="Text Placeholder 2">
-            <a:extLst>
-              <a:ext uri="{FF2B5EF4-FFF2-40B4-BE49-F238E27FC236}">
-                <a16:creationId xmlns:a16="http://schemas.microsoft.com/office/drawing/2014/main" id="{3C47052C-7796-7971-512C-50EC0D09D6B7}"/>
-              </a:ext>
-            </a:extLst>
-          </p:cNvPr>
+            <a:endParaRPr lang="en-US" dirty="0"/>
+          </a:p>
+        </p:txBody>
+      </p:sp>
+      <p:sp>
+        <p:nvSpPr>
+          <p:cNvPr id="3" name="Text Placeholder 2"/>
           <p:cNvSpPr>
             <a:spLocks noGrp="1"/>
           </p:cNvSpPr>
@@ -1003,8 +896,8 @@
         </p:nvSpPr>
         <p:spPr>
           <a:xfrm>
-            <a:off x="831850" y="4589463"/>
-            <a:ext cx="10515600" cy="1500187"/>
+            <a:off x="467916" y="4589465"/>
+            <a:ext cx="5915025" cy="1500187"/>
           </a:xfrm>
         </p:spPr>
         <p:txBody>
@@ -1012,17 +905,15 @@
           <a:lstStyle>
             <a:lvl1pPr marL="0" indent="0">
               <a:buNone/>
-              <a:defRPr sz="2400">
+              <a:defRPr sz="1800">
                 <a:solidFill>
-                  <a:schemeClr val="tx1">
-                    <a:tint val="75000"/>
-                  </a:schemeClr>
+                  <a:schemeClr val="tx1"/>
                 </a:solidFill>
               </a:defRPr>
             </a:lvl1pPr>
-            <a:lvl2pPr marL="457200" indent="0">
-              <a:buNone/>
-              <a:defRPr sz="2000">
+            <a:lvl2pPr marL="342900" indent="0">
+              <a:buNone/>
+              <a:defRPr sz="1500">
                 <a:solidFill>
                   <a:schemeClr val="tx1">
                     <a:tint val="75000"/>
@@ -1030,9 +921,9 @@
                 </a:solidFill>
               </a:defRPr>
             </a:lvl2pPr>
-            <a:lvl3pPr marL="914400" indent="0">
-              <a:buNone/>
-              <a:defRPr sz="1800">
+            <a:lvl3pPr marL="685800" indent="0">
+              <a:buNone/>
+              <a:defRPr sz="1350">
                 <a:solidFill>
                   <a:schemeClr val="tx1">
                     <a:tint val="75000"/>
@@ -1040,9 +931,9 @@
                 </a:solidFill>
               </a:defRPr>
             </a:lvl3pPr>
-            <a:lvl4pPr marL="1371600" indent="0">
-              <a:buNone/>
-              <a:defRPr sz="1600">
+            <a:lvl4pPr marL="1028700" indent="0">
+              <a:buNone/>
+              <a:defRPr sz="1200">
                 <a:solidFill>
                   <a:schemeClr val="tx1">
                     <a:tint val="75000"/>
@@ -1050,9 +941,9 @@
                 </a:solidFill>
               </a:defRPr>
             </a:lvl4pPr>
-            <a:lvl5pPr marL="1828800" indent="0">
-              <a:buNone/>
-              <a:defRPr sz="1600">
+            <a:lvl5pPr marL="1371600" indent="0">
+              <a:buNone/>
+              <a:defRPr sz="1200">
                 <a:solidFill>
                   <a:schemeClr val="tx1">
                     <a:tint val="75000"/>
@@ -1060,9 +951,9 @@
                 </a:solidFill>
               </a:defRPr>
             </a:lvl5pPr>
-            <a:lvl6pPr marL="2286000" indent="0">
-              <a:buNone/>
-              <a:defRPr sz="1600">
+            <a:lvl6pPr marL="1714500" indent="0">
+              <a:buNone/>
+              <a:defRPr sz="1200">
                 <a:solidFill>
                   <a:schemeClr val="tx1">
                     <a:tint val="75000"/>
@@ -1070,9 +961,9 @@
                 </a:solidFill>
               </a:defRPr>
             </a:lvl6pPr>
-            <a:lvl7pPr marL="2743200" indent="0">
-              <a:buNone/>
-              <a:defRPr sz="1600">
+            <a:lvl7pPr marL="2057400" indent="0">
+              <a:buNone/>
+              <a:defRPr sz="1200">
                 <a:solidFill>
                   <a:schemeClr val="tx1">
                     <a:tint val="75000"/>
@@ -1080,9 +971,9 @@
                 </a:solidFill>
               </a:defRPr>
             </a:lvl7pPr>
-            <a:lvl8pPr marL="3200400" indent="0">
-              <a:buNone/>
-              <a:defRPr sz="1600">
+            <a:lvl8pPr marL="2400300" indent="0">
+              <a:buNone/>
+              <a:defRPr sz="1200">
                 <a:solidFill>
                   <a:schemeClr val="tx1">
                     <a:tint val="75000"/>
@@ -1090,9 +981,9 @@
                 </a:solidFill>
               </a:defRPr>
             </a:lvl8pPr>
-            <a:lvl9pPr marL="3657600" indent="0">
-              <a:buNone/>
-              <a:defRPr sz="1600">
+            <a:lvl9pPr marL="2743200" indent="0">
+              <a:buNone/>
+              <a:defRPr sz="1200">
                 <a:solidFill>
                   <a:schemeClr val="tx1">
                     <a:tint val="75000"/>
@@ -1112,13 +1003,7 @@
       </p:sp>
       <p:sp>
         <p:nvSpPr>
-          <p:cNvPr id="4" name="Date Placeholder 3">
-            <a:extLst>
-              <a:ext uri="{FF2B5EF4-FFF2-40B4-BE49-F238E27FC236}">
-                <a16:creationId xmlns:a16="http://schemas.microsoft.com/office/drawing/2014/main" id="{D91D48CA-A34A-1C92-2D4B-CD0F7400EEAC}"/>
-              </a:ext>
-            </a:extLst>
-          </p:cNvPr>
+          <p:cNvPr id="4" name="Date Placeholder 3"/>
           <p:cNvSpPr>
             <a:spLocks noGrp="1"/>
           </p:cNvSpPr>
@@ -1133,7 +1018,7 @@
           <a:p>
             <a:fld id="{83F41DB9-FD7B-43C3-B63D-882497A25A78}" type="datetimeFigureOut">
               <a:rPr lang="en-US" smtClean="0"/>
-              <a:t>7/13/2023</a:t>
+              <a:t>8/11/2023</a:t>
             </a:fld>
             <a:endParaRPr lang="en-US"/>
           </a:p>
@@ -1141,13 +1026,7 @@
       </p:sp>
       <p:sp>
         <p:nvSpPr>
-          <p:cNvPr id="5" name="Footer Placeholder 4">
-            <a:extLst>
-              <a:ext uri="{FF2B5EF4-FFF2-40B4-BE49-F238E27FC236}">
-                <a16:creationId xmlns:a16="http://schemas.microsoft.com/office/drawing/2014/main" id="{6B235859-9C08-9C08-0A5B-78D077F4D8D3}"/>
-              </a:ext>
-            </a:extLst>
-          </p:cNvPr>
+          <p:cNvPr id="5" name="Footer Placeholder 4"/>
           <p:cNvSpPr>
             <a:spLocks noGrp="1"/>
           </p:cNvSpPr>
@@ -1166,13 +1045,7 @@
       </p:sp>
       <p:sp>
         <p:nvSpPr>
-          <p:cNvPr id="6" name="Slide Number Placeholder 5">
-            <a:extLst>
-              <a:ext uri="{FF2B5EF4-FFF2-40B4-BE49-F238E27FC236}">
-                <a16:creationId xmlns:a16="http://schemas.microsoft.com/office/drawing/2014/main" id="{61D76F8C-C177-245A-5512-A48AB9AF7E88}"/>
-              </a:ext>
-            </a:extLst>
-          </p:cNvPr>
+          <p:cNvPr id="6" name="Slide Number Placeholder 5"/>
           <p:cNvSpPr>
             <a:spLocks noGrp="1"/>
           </p:cNvSpPr>
@@ -1196,7 +1069,7 @@
     </p:spTree>
     <p:extLst>
       <p:ext uri="{BB962C8B-B14F-4D97-AF65-F5344CB8AC3E}">
-        <p14:creationId xmlns:p14="http://schemas.microsoft.com/office/powerpoint/2010/main" val="824655733"/>
+        <p14:creationId xmlns:p14="http://schemas.microsoft.com/office/powerpoint/2010/main" val="2767589413"/>
       </p:ext>
     </p:extLst>
   </p:cSld>
@@ -1225,13 +1098,7 @@
       </p:grpSpPr>
       <p:sp>
         <p:nvSpPr>
-          <p:cNvPr id="2" name="Title 1">
-            <a:extLst>
-              <a:ext uri="{FF2B5EF4-FFF2-40B4-BE49-F238E27FC236}">
-                <a16:creationId xmlns:a16="http://schemas.microsoft.com/office/drawing/2014/main" id="{3E49B26E-0518-F094-5205-CD2BA3C98CAD}"/>
-              </a:ext>
-            </a:extLst>
-          </p:cNvPr>
+          <p:cNvPr id="2" name="Title 1"/>
           <p:cNvSpPr>
             <a:spLocks noGrp="1"/>
           </p:cNvSpPr>
@@ -1248,18 +1115,13 @@
               <a:rPr lang="en-US"/>
               <a:t>Click to edit Master title style</a:t>
             </a:r>
-          </a:p>
-        </p:txBody>
-      </p:sp>
-      <p:sp>
-        <p:nvSpPr>
-          <p:cNvPr id="3" name="Content Placeholder 2">
-            <a:extLst>
-              <a:ext uri="{FF2B5EF4-FFF2-40B4-BE49-F238E27FC236}">
-                <a16:creationId xmlns:a16="http://schemas.microsoft.com/office/drawing/2014/main" id="{4B36EF98-014A-67A7-5FEF-80011A8C2018}"/>
-              </a:ext>
-            </a:extLst>
-          </p:cNvPr>
+            <a:endParaRPr lang="en-US" dirty="0"/>
+          </a:p>
+        </p:txBody>
+      </p:sp>
+      <p:sp>
+        <p:nvSpPr>
+          <p:cNvPr id="3" name="Content Placeholder 2"/>
           <p:cNvSpPr>
             <a:spLocks noGrp="1"/>
           </p:cNvSpPr>
@@ -1269,8 +1131,8 @@
         </p:nvSpPr>
         <p:spPr>
           <a:xfrm>
-            <a:off x="838200" y="1825625"/>
-            <a:ext cx="5181600" cy="4351338"/>
+            <a:off x="471488" y="1825625"/>
+            <a:ext cx="2914650" cy="4351338"/>
           </a:xfrm>
         </p:spPr>
         <p:txBody>
@@ -1310,18 +1172,13 @@
               <a:rPr lang="en-US"/>
               <a:t>Fifth level</a:t>
             </a:r>
-          </a:p>
-        </p:txBody>
-      </p:sp>
-      <p:sp>
-        <p:nvSpPr>
-          <p:cNvPr id="4" name="Content Placeholder 3">
-            <a:extLst>
-              <a:ext uri="{FF2B5EF4-FFF2-40B4-BE49-F238E27FC236}">
-                <a16:creationId xmlns:a16="http://schemas.microsoft.com/office/drawing/2014/main" id="{563E71BE-09B1-33F3-6DDC-CBC9A7E96E20}"/>
-              </a:ext>
-            </a:extLst>
-          </p:cNvPr>
+            <a:endParaRPr lang="en-US" dirty="0"/>
+          </a:p>
+        </p:txBody>
+      </p:sp>
+      <p:sp>
+        <p:nvSpPr>
+          <p:cNvPr id="4" name="Content Placeholder 3"/>
           <p:cNvSpPr>
             <a:spLocks noGrp="1"/>
           </p:cNvSpPr>
@@ -1331,8 +1188,8 @@
         </p:nvSpPr>
         <p:spPr>
           <a:xfrm>
-            <a:off x="6172200" y="1825625"/>
-            <a:ext cx="5181600" cy="4351338"/>
+            <a:off x="3471863" y="1825625"/>
+            <a:ext cx="2914650" cy="4351338"/>
           </a:xfrm>
         </p:spPr>
         <p:txBody>
@@ -1372,18 +1229,13 @@
               <a:rPr lang="en-US"/>
               <a:t>Fifth level</a:t>
             </a:r>
-          </a:p>
-        </p:txBody>
-      </p:sp>
-      <p:sp>
-        <p:nvSpPr>
-          <p:cNvPr id="5" name="Date Placeholder 4">
-            <a:extLst>
-              <a:ext uri="{FF2B5EF4-FFF2-40B4-BE49-F238E27FC236}">
-                <a16:creationId xmlns:a16="http://schemas.microsoft.com/office/drawing/2014/main" id="{99B94700-02D4-5B27-4EE8-9088EE9F28B9}"/>
-              </a:ext>
-            </a:extLst>
-          </p:cNvPr>
+            <a:endParaRPr lang="en-US" dirty="0"/>
+          </a:p>
+        </p:txBody>
+      </p:sp>
+      <p:sp>
+        <p:nvSpPr>
+          <p:cNvPr id="5" name="Date Placeholder 4"/>
           <p:cNvSpPr>
             <a:spLocks noGrp="1"/>
           </p:cNvSpPr>
@@ -1398,7 +1250,7 @@
           <a:p>
             <a:fld id="{83F41DB9-FD7B-43C3-B63D-882497A25A78}" type="datetimeFigureOut">
               <a:rPr lang="en-US" smtClean="0"/>
-              <a:t>7/13/2023</a:t>
+              <a:t>8/11/2023</a:t>
             </a:fld>
             <a:endParaRPr lang="en-US"/>
           </a:p>
@@ -1406,13 +1258,7 @@
       </p:sp>
       <p:sp>
         <p:nvSpPr>
-          <p:cNvPr id="6" name="Footer Placeholder 5">
-            <a:extLst>
-              <a:ext uri="{FF2B5EF4-FFF2-40B4-BE49-F238E27FC236}">
-                <a16:creationId xmlns:a16="http://schemas.microsoft.com/office/drawing/2014/main" id="{9D2DD846-6D08-653B-CC43-AC6AD0323FA6}"/>
-              </a:ext>
-            </a:extLst>
-          </p:cNvPr>
+          <p:cNvPr id="6" name="Footer Placeholder 5"/>
           <p:cNvSpPr>
             <a:spLocks noGrp="1"/>
           </p:cNvSpPr>
@@ -1431,13 +1277,7 @@
       </p:sp>
       <p:sp>
         <p:nvSpPr>
-          <p:cNvPr id="7" name="Slide Number Placeholder 6">
-            <a:extLst>
-              <a:ext uri="{FF2B5EF4-FFF2-40B4-BE49-F238E27FC236}">
-                <a16:creationId xmlns:a16="http://schemas.microsoft.com/office/drawing/2014/main" id="{E612E32F-0ADC-FC98-9D9F-484EFEFCED5B}"/>
-              </a:ext>
-            </a:extLst>
-          </p:cNvPr>
+          <p:cNvPr id="7" name="Slide Number Placeholder 6"/>
           <p:cNvSpPr>
             <a:spLocks noGrp="1"/>
           </p:cNvSpPr>
@@ -1461,7 +1301,7 @@
     </p:spTree>
     <p:extLst>
       <p:ext uri="{BB962C8B-B14F-4D97-AF65-F5344CB8AC3E}">
-        <p14:creationId xmlns:p14="http://schemas.microsoft.com/office/powerpoint/2010/main" val="2249209198"/>
+        <p14:creationId xmlns:p14="http://schemas.microsoft.com/office/powerpoint/2010/main" val="2293332390"/>
       </p:ext>
     </p:extLst>
   </p:cSld>
@@ -1490,13 +1330,7 @@
       </p:grpSpPr>
       <p:sp>
         <p:nvSpPr>
-          <p:cNvPr id="2" name="Title 1">
-            <a:extLst>
-              <a:ext uri="{FF2B5EF4-FFF2-40B4-BE49-F238E27FC236}">
-                <a16:creationId xmlns:a16="http://schemas.microsoft.com/office/drawing/2014/main" id="{2582434B-C595-E7E8-EFCA-947322E6D9E2}"/>
-              </a:ext>
-            </a:extLst>
-          </p:cNvPr>
+          <p:cNvPr id="2" name="Title 1"/>
           <p:cNvSpPr>
             <a:spLocks noGrp="1"/>
           </p:cNvSpPr>
@@ -1506,8 +1340,8 @@
         </p:nvSpPr>
         <p:spPr>
           <a:xfrm>
-            <a:off x="839788" y="365125"/>
-            <a:ext cx="10515600" cy="1325563"/>
+            <a:off x="472381" y="365127"/>
+            <a:ext cx="5915025" cy="1325563"/>
           </a:xfrm>
         </p:spPr>
         <p:txBody>
@@ -1518,18 +1352,13 @@
               <a:rPr lang="en-US"/>
               <a:t>Click to edit Master title style</a:t>
             </a:r>
-          </a:p>
-        </p:txBody>
-      </p:sp>
-      <p:sp>
-        <p:nvSpPr>
-          <p:cNvPr id="3" name="Text Placeholder 2">
-            <a:extLst>
-              <a:ext uri="{FF2B5EF4-FFF2-40B4-BE49-F238E27FC236}">
-                <a16:creationId xmlns:a16="http://schemas.microsoft.com/office/drawing/2014/main" id="{BC77D266-3F26-B311-D08E-50782B29EBB9}"/>
-              </a:ext>
-            </a:extLst>
-          </p:cNvPr>
+            <a:endParaRPr lang="en-US" dirty="0"/>
+          </a:p>
+        </p:txBody>
+      </p:sp>
+      <p:sp>
+        <p:nvSpPr>
+          <p:cNvPr id="3" name="Text Placeholder 2"/>
           <p:cNvSpPr>
             <a:spLocks noGrp="1"/>
           </p:cNvSpPr>
@@ -1539,8 +1368,8 @@
         </p:nvSpPr>
         <p:spPr>
           <a:xfrm>
-            <a:off x="839788" y="1681163"/>
-            <a:ext cx="5157787" cy="823912"/>
+            <a:off x="472381" y="1681163"/>
+            <a:ext cx="2901255" cy="823912"/>
           </a:xfrm>
         </p:spPr>
         <p:txBody>
@@ -1548,39 +1377,39 @@
           <a:lstStyle>
             <a:lvl1pPr marL="0" indent="0">
               <a:buNone/>
-              <a:defRPr sz="2400" b="1"/>
+              <a:defRPr sz="1800" b="1"/>
             </a:lvl1pPr>
-            <a:lvl2pPr marL="457200" indent="0">
-              <a:buNone/>
-              <a:defRPr sz="2000" b="1"/>
+            <a:lvl2pPr marL="342900" indent="0">
+              <a:buNone/>
+              <a:defRPr sz="1500" b="1"/>
             </a:lvl2pPr>
-            <a:lvl3pPr marL="914400" indent="0">
-              <a:buNone/>
-              <a:defRPr sz="1800" b="1"/>
+            <a:lvl3pPr marL="685800" indent="0">
+              <a:buNone/>
+              <a:defRPr sz="1350" b="1"/>
             </a:lvl3pPr>
-            <a:lvl4pPr marL="1371600" indent="0">
-              <a:buNone/>
-              <a:defRPr sz="1600" b="1"/>
+            <a:lvl4pPr marL="1028700" indent="0">
+              <a:buNone/>
+              <a:defRPr sz="1200" b="1"/>
             </a:lvl4pPr>
-            <a:lvl5pPr marL="1828800" indent="0">
-              <a:buNone/>
-              <a:defRPr sz="1600" b="1"/>
+            <a:lvl5pPr marL="1371600" indent="0">
+              <a:buNone/>
+              <a:defRPr sz="1200" b="1"/>
             </a:lvl5pPr>
-            <a:lvl6pPr marL="2286000" indent="0">
-              <a:buNone/>
-              <a:defRPr sz="1600" b="1"/>
+            <a:lvl6pPr marL="1714500" indent="0">
+              <a:buNone/>
+              <a:defRPr sz="1200" b="1"/>
             </a:lvl6pPr>
-            <a:lvl7pPr marL="2743200" indent="0">
-              <a:buNone/>
-              <a:defRPr sz="1600" b="1"/>
+            <a:lvl7pPr marL="2057400" indent="0">
+              <a:buNone/>
+              <a:defRPr sz="1200" b="1"/>
             </a:lvl7pPr>
-            <a:lvl8pPr marL="3200400" indent="0">
-              <a:buNone/>
-              <a:defRPr sz="1600" b="1"/>
+            <a:lvl8pPr marL="2400300" indent="0">
+              <a:buNone/>
+              <a:defRPr sz="1200" b="1"/>
             </a:lvl8pPr>
-            <a:lvl9pPr marL="3657600" indent="0">
-              <a:buNone/>
-              <a:defRPr sz="1600" b="1"/>
+            <a:lvl9pPr marL="2743200" indent="0">
+              <a:buNone/>
+              <a:defRPr sz="1200" b="1"/>
             </a:lvl9pPr>
           </a:lstStyle>
           <a:p>
@@ -1594,13 +1423,7 @@
       </p:sp>
       <p:sp>
         <p:nvSpPr>
-          <p:cNvPr id="4" name="Content Placeholder 3">
-            <a:extLst>
-              <a:ext uri="{FF2B5EF4-FFF2-40B4-BE49-F238E27FC236}">
-                <a16:creationId xmlns:a16="http://schemas.microsoft.com/office/drawing/2014/main" id="{D87FE9CA-B7F3-F48E-C700-5E091BFF41F3}"/>
-              </a:ext>
-            </a:extLst>
-          </p:cNvPr>
+          <p:cNvPr id="4" name="Content Placeholder 3"/>
           <p:cNvSpPr>
             <a:spLocks noGrp="1"/>
           </p:cNvSpPr>
@@ -1610,8 +1433,8 @@
         </p:nvSpPr>
         <p:spPr>
           <a:xfrm>
-            <a:off x="839788" y="2505075"/>
-            <a:ext cx="5157787" cy="3684588"/>
+            <a:off x="472381" y="2505075"/>
+            <a:ext cx="2901255" cy="3684588"/>
           </a:xfrm>
         </p:spPr>
         <p:txBody>
@@ -1651,18 +1474,13 @@
               <a:rPr lang="en-US"/>
               <a:t>Fifth level</a:t>
             </a:r>
-          </a:p>
-        </p:txBody>
-      </p:sp>
-      <p:sp>
-        <p:nvSpPr>
-          <p:cNvPr id="5" name="Text Placeholder 4">
-            <a:extLst>
-              <a:ext uri="{FF2B5EF4-FFF2-40B4-BE49-F238E27FC236}">
-                <a16:creationId xmlns:a16="http://schemas.microsoft.com/office/drawing/2014/main" id="{75AABF9F-5F1F-A48C-953D-1076035F7656}"/>
-              </a:ext>
-            </a:extLst>
-          </p:cNvPr>
+            <a:endParaRPr lang="en-US" dirty="0"/>
+          </a:p>
+        </p:txBody>
+      </p:sp>
+      <p:sp>
+        <p:nvSpPr>
+          <p:cNvPr id="5" name="Text Placeholder 4"/>
           <p:cNvSpPr>
             <a:spLocks noGrp="1"/>
           </p:cNvSpPr>
@@ -1672,8 +1490,8 @@
         </p:nvSpPr>
         <p:spPr>
           <a:xfrm>
-            <a:off x="6172200" y="1681163"/>
-            <a:ext cx="5183188" cy="823912"/>
+            <a:off x="3471863" y="1681163"/>
+            <a:ext cx="2915543" cy="823912"/>
           </a:xfrm>
         </p:spPr>
         <p:txBody>
@@ -1681,39 +1499,39 @@
           <a:lstStyle>
             <a:lvl1pPr marL="0" indent="0">
               <a:buNone/>
-              <a:defRPr sz="2400" b="1"/>
+              <a:defRPr sz="1800" b="1"/>
             </a:lvl1pPr>
-            <a:lvl2pPr marL="457200" indent="0">
-              <a:buNone/>
-              <a:defRPr sz="2000" b="1"/>
+            <a:lvl2pPr marL="342900" indent="0">
+              <a:buNone/>
+              <a:defRPr sz="1500" b="1"/>
             </a:lvl2pPr>
-            <a:lvl3pPr marL="914400" indent="0">
-              <a:buNone/>
-              <a:defRPr sz="1800" b="1"/>
+            <a:lvl3pPr marL="685800" indent="0">
+              <a:buNone/>
+              <a:defRPr sz="1350" b="1"/>
             </a:lvl3pPr>
-            <a:lvl4pPr marL="1371600" indent="0">
-              <a:buNone/>
-              <a:defRPr sz="1600" b="1"/>
+            <a:lvl4pPr marL="1028700" indent="0">
+              <a:buNone/>
+              <a:defRPr sz="1200" b="1"/>
             </a:lvl4pPr>
-            <a:lvl5pPr marL="1828800" indent="0">
-              <a:buNone/>
-              <a:defRPr sz="1600" b="1"/>
+            <a:lvl5pPr marL="1371600" indent="0">
+              <a:buNone/>
+              <a:defRPr sz="1200" b="1"/>
             </a:lvl5pPr>
-            <a:lvl6pPr marL="2286000" indent="0">
-              <a:buNone/>
-              <a:defRPr sz="1600" b="1"/>
+            <a:lvl6pPr marL="1714500" indent="0">
+              <a:buNone/>
+              <a:defRPr sz="1200" b="1"/>
             </a:lvl6pPr>
-            <a:lvl7pPr marL="2743200" indent="0">
-              <a:buNone/>
-              <a:defRPr sz="1600" b="1"/>
+            <a:lvl7pPr marL="2057400" indent="0">
+              <a:buNone/>
+              <a:defRPr sz="1200" b="1"/>
             </a:lvl7pPr>
-            <a:lvl8pPr marL="3200400" indent="0">
-              <a:buNone/>
-              <a:defRPr sz="1600" b="1"/>
+            <a:lvl8pPr marL="2400300" indent="0">
+              <a:buNone/>
+              <a:defRPr sz="1200" b="1"/>
             </a:lvl8pPr>
-            <a:lvl9pPr marL="3657600" indent="0">
-              <a:buNone/>
-              <a:defRPr sz="1600" b="1"/>
+            <a:lvl9pPr marL="2743200" indent="0">
+              <a:buNone/>
+              <a:defRPr sz="1200" b="1"/>
             </a:lvl9pPr>
           </a:lstStyle>
           <a:p>
@@ -1727,13 +1545,7 @@
       </p:sp>
       <p:sp>
         <p:nvSpPr>
-          <p:cNvPr id="6" name="Content Placeholder 5">
-            <a:extLst>
-              <a:ext uri="{FF2B5EF4-FFF2-40B4-BE49-F238E27FC236}">
-                <a16:creationId xmlns:a16="http://schemas.microsoft.com/office/drawing/2014/main" id="{3BD3CBBE-850E-AB35-04E5-8CBFC65A09DC}"/>
-              </a:ext>
-            </a:extLst>
-          </p:cNvPr>
+          <p:cNvPr id="6" name="Content Placeholder 5"/>
           <p:cNvSpPr>
             <a:spLocks noGrp="1"/>
           </p:cNvSpPr>
@@ -1743,8 +1555,8 @@
         </p:nvSpPr>
         <p:spPr>
           <a:xfrm>
-            <a:off x="6172200" y="2505075"/>
-            <a:ext cx="5183188" cy="3684588"/>
+            <a:off x="3471863" y="2505075"/>
+            <a:ext cx="2915543" cy="3684588"/>
           </a:xfrm>
         </p:spPr>
         <p:txBody>
@@ -1784,18 +1596,13 @@
               <a:rPr lang="en-US"/>
               <a:t>Fifth level</a:t>
             </a:r>
-          </a:p>
-        </p:txBody>
-      </p:sp>
-      <p:sp>
-        <p:nvSpPr>
-          <p:cNvPr id="7" name="Date Placeholder 6">
-            <a:extLst>
-              <a:ext uri="{FF2B5EF4-FFF2-40B4-BE49-F238E27FC236}">
-                <a16:creationId xmlns:a16="http://schemas.microsoft.com/office/drawing/2014/main" id="{26AB37C0-704C-EF98-13E4-3BD0B30A2E22}"/>
-              </a:ext>
-            </a:extLst>
-          </p:cNvPr>
+            <a:endParaRPr lang="en-US" dirty="0"/>
+          </a:p>
+        </p:txBody>
+      </p:sp>
+      <p:sp>
+        <p:nvSpPr>
+          <p:cNvPr id="7" name="Date Placeholder 6"/>
           <p:cNvSpPr>
             <a:spLocks noGrp="1"/>
           </p:cNvSpPr>
@@ -1810,7 +1617,7 @@
           <a:p>
             <a:fld id="{83F41DB9-FD7B-43C3-B63D-882497A25A78}" type="datetimeFigureOut">
               <a:rPr lang="en-US" smtClean="0"/>
-              <a:t>7/13/2023</a:t>
+              <a:t>8/11/2023</a:t>
             </a:fld>
             <a:endParaRPr lang="en-US"/>
           </a:p>
@@ -1818,13 +1625,7 @@
       </p:sp>
       <p:sp>
         <p:nvSpPr>
-          <p:cNvPr id="8" name="Footer Placeholder 7">
-            <a:extLst>
-              <a:ext uri="{FF2B5EF4-FFF2-40B4-BE49-F238E27FC236}">
-                <a16:creationId xmlns:a16="http://schemas.microsoft.com/office/drawing/2014/main" id="{C5E78E6B-04EF-BDB0-A2C5-B04307238250}"/>
-              </a:ext>
-            </a:extLst>
-          </p:cNvPr>
+          <p:cNvPr id="8" name="Footer Placeholder 7"/>
           <p:cNvSpPr>
             <a:spLocks noGrp="1"/>
           </p:cNvSpPr>
@@ -1843,13 +1644,7 @@
       </p:sp>
       <p:sp>
         <p:nvSpPr>
-          <p:cNvPr id="9" name="Slide Number Placeholder 8">
-            <a:extLst>
-              <a:ext uri="{FF2B5EF4-FFF2-40B4-BE49-F238E27FC236}">
-                <a16:creationId xmlns:a16="http://schemas.microsoft.com/office/drawing/2014/main" id="{6AD01DFD-3845-7440-B3CC-03A961E76C73}"/>
-              </a:ext>
-            </a:extLst>
-          </p:cNvPr>
+          <p:cNvPr id="9" name="Slide Number Placeholder 8"/>
           <p:cNvSpPr>
             <a:spLocks noGrp="1"/>
           </p:cNvSpPr>
@@ -1873,7 +1668,7 @@
     </p:spTree>
     <p:extLst>
       <p:ext uri="{BB962C8B-B14F-4D97-AF65-F5344CB8AC3E}">
-        <p14:creationId xmlns:p14="http://schemas.microsoft.com/office/powerpoint/2010/main" val="511694024"/>
+        <p14:creationId xmlns:p14="http://schemas.microsoft.com/office/powerpoint/2010/main" val="2879750228"/>
       </p:ext>
     </p:extLst>
   </p:cSld>
@@ -1902,13 +1697,7 @@
       </p:grpSpPr>
       <p:sp>
         <p:nvSpPr>
-          <p:cNvPr id="2" name="Title 1">
-            <a:extLst>
-              <a:ext uri="{FF2B5EF4-FFF2-40B4-BE49-F238E27FC236}">
-                <a16:creationId xmlns:a16="http://schemas.microsoft.com/office/drawing/2014/main" id="{ABCC485A-67FB-4DC4-8A0A-53DF08B55FC5}"/>
-              </a:ext>
-            </a:extLst>
-          </p:cNvPr>
+          <p:cNvPr id="2" name="Title 1"/>
           <p:cNvSpPr>
             <a:spLocks noGrp="1"/>
           </p:cNvSpPr>
@@ -1925,18 +1714,13 @@
               <a:rPr lang="en-US"/>
               <a:t>Click to edit Master title style</a:t>
             </a:r>
-          </a:p>
-        </p:txBody>
-      </p:sp>
-      <p:sp>
-        <p:nvSpPr>
-          <p:cNvPr id="3" name="Date Placeholder 2">
-            <a:extLst>
-              <a:ext uri="{FF2B5EF4-FFF2-40B4-BE49-F238E27FC236}">
-                <a16:creationId xmlns:a16="http://schemas.microsoft.com/office/drawing/2014/main" id="{D39236E0-EA6F-CC0A-9642-399EE2D67845}"/>
-              </a:ext>
-            </a:extLst>
-          </p:cNvPr>
+            <a:endParaRPr lang="en-US" dirty="0"/>
+          </a:p>
+        </p:txBody>
+      </p:sp>
+      <p:sp>
+        <p:nvSpPr>
+          <p:cNvPr id="3" name="Date Placeholder 2"/>
           <p:cNvSpPr>
             <a:spLocks noGrp="1"/>
           </p:cNvSpPr>
@@ -1951,7 +1735,7 @@
           <a:p>
             <a:fld id="{83F41DB9-FD7B-43C3-B63D-882497A25A78}" type="datetimeFigureOut">
               <a:rPr lang="en-US" smtClean="0"/>
-              <a:t>7/13/2023</a:t>
+              <a:t>8/11/2023</a:t>
             </a:fld>
             <a:endParaRPr lang="en-US"/>
           </a:p>
@@ -1959,13 +1743,7 @@
       </p:sp>
       <p:sp>
         <p:nvSpPr>
-          <p:cNvPr id="4" name="Footer Placeholder 3">
-            <a:extLst>
-              <a:ext uri="{FF2B5EF4-FFF2-40B4-BE49-F238E27FC236}">
-                <a16:creationId xmlns:a16="http://schemas.microsoft.com/office/drawing/2014/main" id="{2AD83A9A-E24D-B83B-8CA0-00E8DCD51A6C}"/>
-              </a:ext>
-            </a:extLst>
-          </p:cNvPr>
+          <p:cNvPr id="4" name="Footer Placeholder 3"/>
           <p:cNvSpPr>
             <a:spLocks noGrp="1"/>
           </p:cNvSpPr>
@@ -1984,13 +1762,7 @@
       </p:sp>
       <p:sp>
         <p:nvSpPr>
-          <p:cNvPr id="5" name="Slide Number Placeholder 4">
-            <a:extLst>
-              <a:ext uri="{FF2B5EF4-FFF2-40B4-BE49-F238E27FC236}">
-                <a16:creationId xmlns:a16="http://schemas.microsoft.com/office/drawing/2014/main" id="{EF828FEF-E5C5-E325-7BEE-F6C17905AE84}"/>
-              </a:ext>
-            </a:extLst>
-          </p:cNvPr>
+          <p:cNvPr id="5" name="Slide Number Placeholder 4"/>
           <p:cNvSpPr>
             <a:spLocks noGrp="1"/>
           </p:cNvSpPr>
@@ -2014,7 +1786,7 @@
     </p:spTree>
     <p:extLst>
       <p:ext uri="{BB962C8B-B14F-4D97-AF65-F5344CB8AC3E}">
-        <p14:creationId xmlns:p14="http://schemas.microsoft.com/office/powerpoint/2010/main" val="3024952924"/>
+        <p14:creationId xmlns:p14="http://schemas.microsoft.com/office/powerpoint/2010/main" val="4040233924"/>
       </p:ext>
     </p:extLst>
   </p:cSld>
@@ -2043,13 +1815,7 @@
       </p:grpSpPr>
       <p:sp>
         <p:nvSpPr>
-          <p:cNvPr id="2" name="Date Placeholder 1">
-            <a:extLst>
-              <a:ext uri="{FF2B5EF4-FFF2-40B4-BE49-F238E27FC236}">
-                <a16:creationId xmlns:a16="http://schemas.microsoft.com/office/drawing/2014/main" id="{0C4CFCAF-0589-E1D9-4026-D509FBE1D229}"/>
-              </a:ext>
-            </a:extLst>
-          </p:cNvPr>
+          <p:cNvPr id="2" name="Date Placeholder 1"/>
           <p:cNvSpPr>
             <a:spLocks noGrp="1"/>
           </p:cNvSpPr>
@@ -2064,7 +1830,7 @@
           <a:p>
             <a:fld id="{83F41DB9-FD7B-43C3-B63D-882497A25A78}" type="datetimeFigureOut">
               <a:rPr lang="en-US" smtClean="0"/>
-              <a:t>7/13/2023</a:t>
+              <a:t>8/11/2023</a:t>
             </a:fld>
             <a:endParaRPr lang="en-US"/>
           </a:p>
@@ -2072,13 +1838,7 @@
       </p:sp>
       <p:sp>
         <p:nvSpPr>
-          <p:cNvPr id="3" name="Footer Placeholder 2">
-            <a:extLst>
-              <a:ext uri="{FF2B5EF4-FFF2-40B4-BE49-F238E27FC236}">
-                <a16:creationId xmlns:a16="http://schemas.microsoft.com/office/drawing/2014/main" id="{A71273E9-5C26-7CFE-B436-65603C95B1F2}"/>
-              </a:ext>
-            </a:extLst>
-          </p:cNvPr>
+          <p:cNvPr id="3" name="Footer Placeholder 2"/>
           <p:cNvSpPr>
             <a:spLocks noGrp="1"/>
           </p:cNvSpPr>
@@ -2097,13 +1857,7 @@
       </p:sp>
       <p:sp>
         <p:nvSpPr>
-          <p:cNvPr id="4" name="Slide Number Placeholder 3">
-            <a:extLst>
-              <a:ext uri="{FF2B5EF4-FFF2-40B4-BE49-F238E27FC236}">
-                <a16:creationId xmlns:a16="http://schemas.microsoft.com/office/drawing/2014/main" id="{9577A5F8-E63F-BC5E-76C0-73E9E498AB27}"/>
-              </a:ext>
-            </a:extLst>
-          </p:cNvPr>
+          <p:cNvPr id="4" name="Slide Number Placeholder 3"/>
           <p:cNvSpPr>
             <a:spLocks noGrp="1"/>
           </p:cNvSpPr>
@@ -2127,7 +1881,7 @@
     </p:spTree>
     <p:extLst>
       <p:ext uri="{BB962C8B-B14F-4D97-AF65-F5344CB8AC3E}">
-        <p14:creationId xmlns:p14="http://schemas.microsoft.com/office/powerpoint/2010/main" val="2884844000"/>
+        <p14:creationId xmlns:p14="http://schemas.microsoft.com/office/powerpoint/2010/main" val="262284015"/>
       </p:ext>
     </p:extLst>
   </p:cSld>
@@ -2156,13 +1910,7 @@
       </p:grpSpPr>
       <p:sp>
         <p:nvSpPr>
-          <p:cNvPr id="2" name="Title 1">
-            <a:extLst>
-              <a:ext uri="{FF2B5EF4-FFF2-40B4-BE49-F238E27FC236}">
-                <a16:creationId xmlns:a16="http://schemas.microsoft.com/office/drawing/2014/main" id="{493041C6-7FE8-795F-65F7-EE88436290E2}"/>
-              </a:ext>
-            </a:extLst>
-          </p:cNvPr>
+          <p:cNvPr id="2" name="Title 1"/>
           <p:cNvSpPr>
             <a:spLocks noGrp="1"/>
           </p:cNvSpPr>
@@ -2172,15 +1920,15 @@
         </p:nvSpPr>
         <p:spPr>
           <a:xfrm>
-            <a:off x="839788" y="457200"/>
-            <a:ext cx="3932237" cy="1600200"/>
+            <a:off x="472381" y="457200"/>
+            <a:ext cx="2211884" cy="1600200"/>
           </a:xfrm>
         </p:spPr>
         <p:txBody>
           <a:bodyPr anchor="b"/>
           <a:lstStyle>
             <a:lvl1pPr>
-              <a:defRPr sz="3200"/>
+              <a:defRPr sz="2400"/>
             </a:lvl1pPr>
           </a:lstStyle>
           <a:p>
@@ -2188,18 +1936,13 @@
               <a:rPr lang="en-US"/>
               <a:t>Click to edit Master title style</a:t>
             </a:r>
-          </a:p>
-        </p:txBody>
-      </p:sp>
-      <p:sp>
-        <p:nvSpPr>
-          <p:cNvPr id="3" name="Content Placeholder 2">
-            <a:extLst>
-              <a:ext uri="{FF2B5EF4-FFF2-40B4-BE49-F238E27FC236}">
-                <a16:creationId xmlns:a16="http://schemas.microsoft.com/office/drawing/2014/main" id="{477DEE87-A2D2-2033-4414-0B409317ABED}"/>
-              </a:ext>
-            </a:extLst>
-          </p:cNvPr>
+            <a:endParaRPr lang="en-US" dirty="0"/>
+          </a:p>
+        </p:txBody>
+      </p:sp>
+      <p:sp>
+        <p:nvSpPr>
+          <p:cNvPr id="3" name="Content Placeholder 2"/>
           <p:cNvSpPr>
             <a:spLocks noGrp="1"/>
           </p:cNvSpPr>
@@ -2209,39 +1952,39 @@
         </p:nvSpPr>
         <p:spPr>
           <a:xfrm>
-            <a:off x="5183188" y="987425"/>
-            <a:ext cx="6172200" cy="4873625"/>
+            <a:off x="2915543" y="987427"/>
+            <a:ext cx="3471863" cy="4873625"/>
           </a:xfrm>
         </p:spPr>
         <p:txBody>
           <a:bodyPr/>
           <a:lstStyle>
             <a:lvl1pPr>
-              <a:defRPr sz="3200"/>
+              <a:defRPr sz="2400"/>
             </a:lvl1pPr>
             <a:lvl2pPr>
-              <a:defRPr sz="2800"/>
+              <a:defRPr sz="2100"/>
             </a:lvl2pPr>
             <a:lvl3pPr>
-              <a:defRPr sz="2400"/>
+              <a:defRPr sz="1800"/>
             </a:lvl3pPr>
             <a:lvl4pPr>
-              <a:defRPr sz="2000"/>
+              <a:defRPr sz="1500"/>
             </a:lvl4pPr>
             <a:lvl5pPr>
-              <a:defRPr sz="2000"/>
+              <a:defRPr sz="1500"/>
             </a:lvl5pPr>
             <a:lvl6pPr>
-              <a:defRPr sz="2000"/>
+              <a:defRPr sz="1500"/>
             </a:lvl6pPr>
             <a:lvl7pPr>
-              <a:defRPr sz="2000"/>
+              <a:defRPr sz="1500"/>
             </a:lvl7pPr>
             <a:lvl8pPr>
-              <a:defRPr sz="2000"/>
+              <a:defRPr sz="1500"/>
             </a:lvl8pPr>
             <a:lvl9pPr>
-              <a:defRPr sz="2000"/>
+              <a:defRPr sz="1500"/>
             </a:lvl9pPr>
           </a:lstStyle>
           <a:p>
@@ -2278,18 +2021,13 @@
               <a:rPr lang="en-US"/>
               <a:t>Fifth level</a:t>
             </a:r>
-          </a:p>
-        </p:txBody>
-      </p:sp>
-      <p:sp>
-        <p:nvSpPr>
-          <p:cNvPr id="4" name="Text Placeholder 3">
-            <a:extLst>
-              <a:ext uri="{FF2B5EF4-FFF2-40B4-BE49-F238E27FC236}">
-                <a16:creationId xmlns:a16="http://schemas.microsoft.com/office/drawing/2014/main" id="{8DA1D9FB-3B5D-FB4E-B058-A6A890F1189E}"/>
-              </a:ext>
-            </a:extLst>
-          </p:cNvPr>
+            <a:endParaRPr lang="en-US" dirty="0"/>
+          </a:p>
+        </p:txBody>
+      </p:sp>
+      <p:sp>
+        <p:nvSpPr>
+          <p:cNvPr id="4" name="Text Placeholder 3"/>
           <p:cNvSpPr>
             <a:spLocks noGrp="1"/>
           </p:cNvSpPr>
@@ -2299,8 +2037,8 @@
         </p:nvSpPr>
         <p:spPr>
           <a:xfrm>
-            <a:off x="839788" y="2057400"/>
-            <a:ext cx="3932237" cy="3811588"/>
+            <a:off x="472381" y="2057400"/>
+            <a:ext cx="2211884" cy="3811588"/>
           </a:xfrm>
         </p:spPr>
         <p:txBody>
@@ -2308,39 +2046,39 @@
           <a:lstStyle>
             <a:lvl1pPr marL="0" indent="0">
               <a:buNone/>
-              <a:defRPr sz="1600"/>
+              <a:defRPr sz="1200"/>
             </a:lvl1pPr>
-            <a:lvl2pPr marL="457200" indent="0">
-              <a:buNone/>
-              <a:defRPr sz="1400"/>
+            <a:lvl2pPr marL="342900" indent="0">
+              <a:buNone/>
+              <a:defRPr sz="1050"/>
             </a:lvl2pPr>
-            <a:lvl3pPr marL="914400" indent="0">
-              <a:buNone/>
-              <a:defRPr sz="1200"/>
+            <a:lvl3pPr marL="685800" indent="0">
+              <a:buNone/>
+              <a:defRPr sz="900"/>
             </a:lvl3pPr>
-            <a:lvl4pPr marL="1371600" indent="0">
-              <a:buNone/>
-              <a:defRPr sz="1000"/>
+            <a:lvl4pPr marL="1028700" indent="0">
+              <a:buNone/>
+              <a:defRPr sz="750"/>
             </a:lvl4pPr>
-            <a:lvl5pPr marL="1828800" indent="0">
-              <a:buNone/>
-              <a:defRPr sz="1000"/>
+            <a:lvl5pPr marL="1371600" indent="0">
+              <a:buNone/>
+              <a:defRPr sz="750"/>
             </a:lvl5pPr>
-            <a:lvl6pPr marL="2286000" indent="0">
-              <a:buNone/>
-              <a:defRPr sz="1000"/>
+            <a:lvl6pPr marL="1714500" indent="0">
+              <a:buNone/>
+              <a:defRPr sz="750"/>
             </a:lvl6pPr>
-            <a:lvl7pPr marL="2743200" indent="0">
-              <a:buNone/>
-              <a:defRPr sz="1000"/>
+            <a:lvl7pPr marL="2057400" indent="0">
+              <a:buNone/>
+              <a:defRPr sz="750"/>
             </a:lvl7pPr>
-            <a:lvl8pPr marL="3200400" indent="0">
-              <a:buNone/>
-              <a:defRPr sz="1000"/>
+            <a:lvl8pPr marL="2400300" indent="0">
+              <a:buNone/>
+              <a:defRPr sz="750"/>
             </a:lvl8pPr>
-            <a:lvl9pPr marL="3657600" indent="0">
-              <a:buNone/>
-              <a:defRPr sz="1000"/>
+            <a:lvl9pPr marL="2743200" indent="0">
+              <a:buNone/>
+              <a:defRPr sz="750"/>
             </a:lvl9pPr>
           </a:lstStyle>
           <a:p>
@@ -2354,13 +2092,7 @@
       </p:sp>
       <p:sp>
         <p:nvSpPr>
-          <p:cNvPr id="5" name="Date Placeholder 4">
-            <a:extLst>
-              <a:ext uri="{FF2B5EF4-FFF2-40B4-BE49-F238E27FC236}">
-                <a16:creationId xmlns:a16="http://schemas.microsoft.com/office/drawing/2014/main" id="{5BF8A6A2-BCDE-E669-8BF3-D278DBDD1732}"/>
-              </a:ext>
-            </a:extLst>
-          </p:cNvPr>
+          <p:cNvPr id="5" name="Date Placeholder 4"/>
           <p:cNvSpPr>
             <a:spLocks noGrp="1"/>
           </p:cNvSpPr>
@@ -2375,7 +2107,7 @@
           <a:p>
             <a:fld id="{83F41DB9-FD7B-43C3-B63D-882497A25A78}" type="datetimeFigureOut">
               <a:rPr lang="en-US" smtClean="0"/>
-              <a:t>7/13/2023</a:t>
+              <a:t>8/11/2023</a:t>
             </a:fld>
             <a:endParaRPr lang="en-US"/>
           </a:p>
@@ -2383,13 +2115,7 @@
       </p:sp>
       <p:sp>
         <p:nvSpPr>
-          <p:cNvPr id="6" name="Footer Placeholder 5">
-            <a:extLst>
-              <a:ext uri="{FF2B5EF4-FFF2-40B4-BE49-F238E27FC236}">
-                <a16:creationId xmlns:a16="http://schemas.microsoft.com/office/drawing/2014/main" id="{A21C2843-1761-798C-8954-0E316FDEE09D}"/>
-              </a:ext>
-            </a:extLst>
-          </p:cNvPr>
+          <p:cNvPr id="6" name="Footer Placeholder 5"/>
           <p:cNvSpPr>
             <a:spLocks noGrp="1"/>
           </p:cNvSpPr>
@@ -2408,13 +2134,7 @@
       </p:sp>
       <p:sp>
         <p:nvSpPr>
-          <p:cNvPr id="7" name="Slide Number Placeholder 6">
-            <a:extLst>
-              <a:ext uri="{FF2B5EF4-FFF2-40B4-BE49-F238E27FC236}">
-                <a16:creationId xmlns:a16="http://schemas.microsoft.com/office/drawing/2014/main" id="{0F89B8FF-6516-9B14-B3D9-DE6913786C27}"/>
-              </a:ext>
-            </a:extLst>
-          </p:cNvPr>
+          <p:cNvPr id="7" name="Slide Number Placeholder 6"/>
           <p:cNvSpPr>
             <a:spLocks noGrp="1"/>
           </p:cNvSpPr>
@@ -2438,7 +2158,7 @@
     </p:spTree>
     <p:extLst>
       <p:ext uri="{BB962C8B-B14F-4D97-AF65-F5344CB8AC3E}">
-        <p14:creationId xmlns:p14="http://schemas.microsoft.com/office/powerpoint/2010/main" val="973243631"/>
+        <p14:creationId xmlns:p14="http://schemas.microsoft.com/office/powerpoint/2010/main" val="1081820103"/>
       </p:ext>
     </p:extLst>
   </p:cSld>
@@ -2467,13 +2187,7 @@
       </p:grpSpPr>
       <p:sp>
         <p:nvSpPr>
-          <p:cNvPr id="2" name="Title 1">
-            <a:extLst>
-              <a:ext uri="{FF2B5EF4-FFF2-40B4-BE49-F238E27FC236}">
-                <a16:creationId xmlns:a16="http://schemas.microsoft.com/office/drawing/2014/main" id="{129ECAB6-4D9B-9C8A-93A3-A04CFF203547}"/>
-              </a:ext>
-            </a:extLst>
-          </p:cNvPr>
+          <p:cNvPr id="2" name="Title 1"/>
           <p:cNvSpPr>
             <a:spLocks noGrp="1"/>
           </p:cNvSpPr>
@@ -2483,15 +2197,15 @@
         </p:nvSpPr>
         <p:spPr>
           <a:xfrm>
-            <a:off x="839788" y="457200"/>
-            <a:ext cx="3932237" cy="1600200"/>
+            <a:off x="472381" y="457200"/>
+            <a:ext cx="2211884" cy="1600200"/>
           </a:xfrm>
         </p:spPr>
         <p:txBody>
           <a:bodyPr anchor="b"/>
           <a:lstStyle>
             <a:lvl1pPr>
-              <a:defRPr sz="3200"/>
+              <a:defRPr sz="2400"/>
             </a:lvl1pPr>
           </a:lstStyle>
           <a:p>
@@ -2499,20 +2213,15 @@
               <a:rPr lang="en-US"/>
               <a:t>Click to edit Master title style</a:t>
             </a:r>
-          </a:p>
-        </p:txBody>
-      </p:sp>
-      <p:sp>
-        <p:nvSpPr>
-          <p:cNvPr id="3" name="Picture Placeholder 2">
-            <a:extLst>
-              <a:ext uri="{FF2B5EF4-FFF2-40B4-BE49-F238E27FC236}">
-                <a16:creationId xmlns:a16="http://schemas.microsoft.com/office/drawing/2014/main" id="{FA6B828C-7B63-8DE9-5D59-71A0A033A0E3}"/>
-              </a:ext>
-            </a:extLst>
-          </p:cNvPr>
-          <p:cNvSpPr>
-            <a:spLocks noGrp="1"/>
+            <a:endParaRPr lang="en-US" dirty="0"/>
+          </a:p>
+        </p:txBody>
+      </p:sp>
+      <p:sp>
+        <p:nvSpPr>
+          <p:cNvPr id="3" name="Picture Placeholder 2"/>
+          <p:cNvSpPr>
+            <a:spLocks noGrp="1" noChangeAspect="1"/>
           </p:cNvSpPr>
           <p:nvPr>
             <p:ph type="pic" idx="1"/>
@@ -2520,64 +2229,62 @@
         </p:nvSpPr>
         <p:spPr>
           <a:xfrm>
-            <a:off x="5183188" y="987425"/>
-            <a:ext cx="6172200" cy="4873625"/>
+            <a:off x="2915543" y="987427"/>
+            <a:ext cx="3471863" cy="4873625"/>
           </a:xfrm>
         </p:spPr>
         <p:txBody>
-          <a:bodyPr/>
+          <a:bodyPr anchor="t"/>
           <a:lstStyle>
             <a:lvl1pPr marL="0" indent="0">
               <a:buNone/>
-              <a:defRPr sz="3200"/>
+              <a:defRPr sz="2400"/>
             </a:lvl1pPr>
-            <a:lvl2pPr marL="457200" indent="0">
-              <a:buNone/>
-              <a:defRPr sz="2800"/>
+            <a:lvl2pPr marL="342900" indent="0">
+              <a:buNone/>
+              <a:defRPr sz="2100"/>
             </a:lvl2pPr>
-            <a:lvl3pPr marL="914400" indent="0">
-              <a:buNone/>
-              <a:defRPr sz="2400"/>
+            <a:lvl3pPr marL="685800" indent="0">
+              <a:buNone/>
+              <a:defRPr sz="1800"/>
             </a:lvl3pPr>
-            <a:lvl4pPr marL="1371600" indent="0">
-              <a:buNone/>
-              <a:defRPr sz="2000"/>
+            <a:lvl4pPr marL="1028700" indent="0">
+              <a:buNone/>
+              <a:defRPr sz="1500"/>
             </a:lvl4pPr>
-            <a:lvl5pPr marL="1828800" indent="0">
-              <a:buNone/>
-              <a:defRPr sz="2000"/>
+            <a:lvl5pPr marL="1371600" indent="0">
+              <a:buNone/>
+              <a:defRPr sz="1500"/>
             </a:lvl5pPr>
-            <a:lvl6pPr marL="2286000" indent="0">
-              <a:buNone/>
-              <a:defRPr sz="2000"/>
+            <a:lvl6pPr marL="1714500" indent="0">
+              <a:buNone/>
+              <a:defRPr sz="1500"/>
             </a:lvl6pPr>
-            <a:lvl7pPr marL="2743200" indent="0">
-              <a:buNone/>
-              <a:defRPr sz="2000"/>
+            <a:lvl7pPr marL="2057400" indent="0">
+              <a:buNone/>
+              <a:defRPr sz="1500"/>
             </a:lvl7pPr>
-            <a:lvl8pPr marL="3200400" indent="0">
-              <a:buNone/>
-              <a:defRPr sz="2000"/>
+            <a:lvl8pPr marL="2400300" indent="0">
+              <a:buNone/>
+              <a:defRPr sz="1500"/>
             </a:lvl8pPr>
-            <a:lvl9pPr marL="3657600" indent="0">
-              <a:buNone/>
-              <a:defRPr sz="2000"/>
+            <a:lvl9pPr marL="2743200" indent="0">
+              <a:buNone/>
+              <a:defRPr sz="1500"/>
             </a:lvl9pPr>
           </a:lstStyle>
           <a:p>
-            <a:endParaRPr lang="en-US"/>
-          </a:p>
-        </p:txBody>
-      </p:sp>
-      <p:sp>
-        <p:nvSpPr>
-          <p:cNvPr id="4" name="Text Placeholder 3">
-            <a:extLst>
-              <a:ext uri="{FF2B5EF4-FFF2-40B4-BE49-F238E27FC236}">
-                <a16:creationId xmlns:a16="http://schemas.microsoft.com/office/drawing/2014/main" id="{395FFF42-84A5-ACB4-7ED1-E34DD80F20FE}"/>
-              </a:ext>
-            </a:extLst>
-          </p:cNvPr>
+            <a:r>
+              <a:rPr lang="en-US"/>
+              <a:t>Click icon to add picture</a:t>
+            </a:r>
+            <a:endParaRPr lang="en-US" dirty="0"/>
+          </a:p>
+        </p:txBody>
+      </p:sp>
+      <p:sp>
+        <p:nvSpPr>
+          <p:cNvPr id="4" name="Text Placeholder 3"/>
           <p:cNvSpPr>
             <a:spLocks noGrp="1"/>
           </p:cNvSpPr>
@@ -2587,8 +2294,8 @@
         </p:nvSpPr>
         <p:spPr>
           <a:xfrm>
-            <a:off x="839788" y="2057400"/>
-            <a:ext cx="3932237" cy="3811588"/>
+            <a:off x="472381" y="2057400"/>
+            <a:ext cx="2211884" cy="3811588"/>
           </a:xfrm>
         </p:spPr>
         <p:txBody>
@@ -2596,39 +2303,39 @@
           <a:lstStyle>
             <a:lvl1pPr marL="0" indent="0">
               <a:buNone/>
-              <a:defRPr sz="1600"/>
+              <a:defRPr sz="1200"/>
             </a:lvl1pPr>
-            <a:lvl2pPr marL="457200" indent="0">
-              <a:buNone/>
-              <a:defRPr sz="1400"/>
+            <a:lvl2pPr marL="342900" indent="0">
+              <a:buNone/>
+              <a:defRPr sz="1050"/>
             </a:lvl2pPr>
-            <a:lvl3pPr marL="914400" indent="0">
-              <a:buNone/>
-              <a:defRPr sz="1200"/>
+            <a:lvl3pPr marL="685800" indent="0">
+              <a:buNone/>
+              <a:defRPr sz="900"/>
             </a:lvl3pPr>
-            <a:lvl4pPr marL="1371600" indent="0">
-              <a:buNone/>
-              <a:defRPr sz="1000"/>
+            <a:lvl4pPr marL="1028700" indent="0">
+              <a:buNone/>
+              <a:defRPr sz="750"/>
             </a:lvl4pPr>
-            <a:lvl5pPr marL="1828800" indent="0">
-              <a:buNone/>
-              <a:defRPr sz="1000"/>
+            <a:lvl5pPr marL="1371600" indent="0">
+              <a:buNone/>
+              <a:defRPr sz="750"/>
             </a:lvl5pPr>
-            <a:lvl6pPr marL="2286000" indent="0">
-              <a:buNone/>
-              <a:defRPr sz="1000"/>
+            <a:lvl6pPr marL="1714500" indent="0">
+              <a:buNone/>
+              <a:defRPr sz="750"/>
             </a:lvl6pPr>
-            <a:lvl7pPr marL="2743200" indent="0">
-              <a:buNone/>
-              <a:defRPr sz="1000"/>
+            <a:lvl7pPr marL="2057400" indent="0">
+              <a:buNone/>
+              <a:defRPr sz="750"/>
             </a:lvl7pPr>
-            <a:lvl8pPr marL="3200400" indent="0">
-              <a:buNone/>
-              <a:defRPr sz="1000"/>
+            <a:lvl8pPr marL="2400300" indent="0">
+              <a:buNone/>
+              <a:defRPr sz="750"/>
             </a:lvl8pPr>
-            <a:lvl9pPr marL="3657600" indent="0">
-              <a:buNone/>
-              <a:defRPr sz="1000"/>
+            <a:lvl9pPr marL="2743200" indent="0">
+              <a:buNone/>
+              <a:defRPr sz="750"/>
             </a:lvl9pPr>
           </a:lstStyle>
           <a:p>
@@ -2642,13 +2349,7 @@
       </p:sp>
       <p:sp>
         <p:nvSpPr>
-          <p:cNvPr id="5" name="Date Placeholder 4">
-            <a:extLst>
-              <a:ext uri="{FF2B5EF4-FFF2-40B4-BE49-F238E27FC236}">
-                <a16:creationId xmlns:a16="http://schemas.microsoft.com/office/drawing/2014/main" id="{593B5139-F8FB-314E-B6C6-6CB8B7735A10}"/>
-              </a:ext>
-            </a:extLst>
-          </p:cNvPr>
+          <p:cNvPr id="5" name="Date Placeholder 4"/>
           <p:cNvSpPr>
             <a:spLocks noGrp="1"/>
           </p:cNvSpPr>
@@ -2663,7 +2364,7 @@
           <a:p>
             <a:fld id="{83F41DB9-FD7B-43C3-B63D-882497A25A78}" type="datetimeFigureOut">
               <a:rPr lang="en-US" smtClean="0"/>
-              <a:t>7/13/2023</a:t>
+              <a:t>8/11/2023</a:t>
             </a:fld>
             <a:endParaRPr lang="en-US"/>
           </a:p>
@@ -2671,13 +2372,7 @@
       </p:sp>
       <p:sp>
         <p:nvSpPr>
-          <p:cNvPr id="6" name="Footer Placeholder 5">
-            <a:extLst>
-              <a:ext uri="{FF2B5EF4-FFF2-40B4-BE49-F238E27FC236}">
-                <a16:creationId xmlns:a16="http://schemas.microsoft.com/office/drawing/2014/main" id="{B0645226-CC4B-B89B-FA12-69986BB236D5}"/>
-              </a:ext>
-            </a:extLst>
-          </p:cNvPr>
+          <p:cNvPr id="6" name="Footer Placeholder 5"/>
           <p:cNvSpPr>
             <a:spLocks noGrp="1"/>
           </p:cNvSpPr>
@@ -2696,13 +2391,7 @@
       </p:sp>
       <p:sp>
         <p:nvSpPr>
-          <p:cNvPr id="7" name="Slide Number Placeholder 6">
-            <a:extLst>
-              <a:ext uri="{FF2B5EF4-FFF2-40B4-BE49-F238E27FC236}">
-                <a16:creationId xmlns:a16="http://schemas.microsoft.com/office/drawing/2014/main" id="{77C49EC1-67B3-B43A-C677-CB142F2C00F5}"/>
-              </a:ext>
-            </a:extLst>
-          </p:cNvPr>
+          <p:cNvPr id="7" name="Slide Number Placeholder 6"/>
           <p:cNvSpPr>
             <a:spLocks noGrp="1"/>
           </p:cNvSpPr>
@@ -2726,7 +2415,7 @@
     </p:spTree>
     <p:extLst>
       <p:ext uri="{BB962C8B-B14F-4D97-AF65-F5344CB8AC3E}">
-        <p14:creationId xmlns:p14="http://schemas.microsoft.com/office/powerpoint/2010/main" val="4028872029"/>
+        <p14:creationId xmlns:p14="http://schemas.microsoft.com/office/powerpoint/2010/main" val="3065563946"/>
       </p:ext>
     </p:extLst>
   </p:cSld>
@@ -2760,13 +2449,7 @@
       </p:grpSpPr>
       <p:sp>
         <p:nvSpPr>
-          <p:cNvPr id="2" name="Title Placeholder 1">
-            <a:extLst>
-              <a:ext uri="{FF2B5EF4-FFF2-40B4-BE49-F238E27FC236}">
-                <a16:creationId xmlns:a16="http://schemas.microsoft.com/office/drawing/2014/main" id="{C946152B-15F3-AB0F-EC20-3BD3D19F37A1}"/>
-              </a:ext>
-            </a:extLst>
-          </p:cNvPr>
+          <p:cNvPr id="2" name="Title Placeholder 1"/>
           <p:cNvSpPr>
             <a:spLocks noGrp="1"/>
           </p:cNvSpPr>
@@ -2776,8 +2459,8 @@
         </p:nvSpPr>
         <p:spPr>
           <a:xfrm>
-            <a:off x="838200" y="365125"/>
-            <a:ext cx="10515600" cy="1325563"/>
+            <a:off x="471488" y="365127"/>
+            <a:ext cx="5915025" cy="1325563"/>
           </a:xfrm>
           <a:prstGeom prst="rect">
             <a:avLst/>
@@ -2793,18 +2476,13 @@
               <a:rPr lang="en-US"/>
               <a:t>Click to edit Master title style</a:t>
             </a:r>
-          </a:p>
-        </p:txBody>
-      </p:sp>
-      <p:sp>
-        <p:nvSpPr>
-          <p:cNvPr id="3" name="Text Placeholder 2">
-            <a:extLst>
-              <a:ext uri="{FF2B5EF4-FFF2-40B4-BE49-F238E27FC236}">
-                <a16:creationId xmlns:a16="http://schemas.microsoft.com/office/drawing/2014/main" id="{A91CFCE2-48B8-ADB9-1892-A1A5BF970F31}"/>
-              </a:ext>
-            </a:extLst>
-          </p:cNvPr>
+            <a:endParaRPr lang="en-US" dirty="0"/>
+          </a:p>
+        </p:txBody>
+      </p:sp>
+      <p:sp>
+        <p:nvSpPr>
+          <p:cNvPr id="3" name="Text Placeholder 2"/>
           <p:cNvSpPr>
             <a:spLocks noGrp="1"/>
           </p:cNvSpPr>
@@ -2814,8 +2492,8 @@
         </p:nvSpPr>
         <p:spPr>
           <a:xfrm>
-            <a:off x="838200" y="1825625"/>
-            <a:ext cx="10515600" cy="4351338"/>
+            <a:off x="471488" y="1825625"/>
+            <a:ext cx="5915025" cy="4351338"/>
           </a:xfrm>
           <a:prstGeom prst="rect">
             <a:avLst/>
@@ -2860,18 +2538,13 @@
               <a:rPr lang="en-US"/>
               <a:t>Fifth level</a:t>
             </a:r>
-          </a:p>
-        </p:txBody>
-      </p:sp>
-      <p:sp>
-        <p:nvSpPr>
-          <p:cNvPr id="4" name="Date Placeholder 3">
-            <a:extLst>
-              <a:ext uri="{FF2B5EF4-FFF2-40B4-BE49-F238E27FC236}">
-                <a16:creationId xmlns:a16="http://schemas.microsoft.com/office/drawing/2014/main" id="{06A74736-AA64-00DB-AF61-1DB5E8CE3608}"/>
-              </a:ext>
-            </a:extLst>
-          </p:cNvPr>
+            <a:endParaRPr lang="en-US" dirty="0"/>
+          </a:p>
+        </p:txBody>
+      </p:sp>
+      <p:sp>
+        <p:nvSpPr>
+          <p:cNvPr id="4" name="Date Placeholder 3"/>
           <p:cNvSpPr>
             <a:spLocks noGrp="1"/>
           </p:cNvSpPr>
@@ -2881,8 +2554,8 @@
         </p:nvSpPr>
         <p:spPr>
           <a:xfrm>
-            <a:off x="838200" y="6356350"/>
-            <a:ext cx="2743200" cy="365125"/>
+            <a:off x="471488" y="6356352"/>
+            <a:ext cx="1543050" cy="365125"/>
           </a:xfrm>
           <a:prstGeom prst="rect">
             <a:avLst/>
@@ -2892,7 +2565,7 @@
           <a:bodyPr vert="horz" lIns="91440" tIns="45720" rIns="91440" bIns="45720" rtlCol="0" anchor="ctr"/>
           <a:lstStyle>
             <a:lvl1pPr algn="l">
-              <a:defRPr sz="1200">
+              <a:defRPr sz="900">
                 <a:solidFill>
                   <a:schemeClr val="tx1">
                     <a:tint val="75000"/>
@@ -2904,7 +2577,7 @@
           <a:p>
             <a:fld id="{83F41DB9-FD7B-43C3-B63D-882497A25A78}" type="datetimeFigureOut">
               <a:rPr lang="en-US" smtClean="0"/>
-              <a:t>7/13/2023</a:t>
+              <a:t>8/11/2023</a:t>
             </a:fld>
             <a:endParaRPr lang="en-US"/>
           </a:p>
@@ -2912,13 +2585,7 @@
       </p:sp>
       <p:sp>
         <p:nvSpPr>
-          <p:cNvPr id="5" name="Footer Placeholder 4">
-            <a:extLst>
-              <a:ext uri="{FF2B5EF4-FFF2-40B4-BE49-F238E27FC236}">
-                <a16:creationId xmlns:a16="http://schemas.microsoft.com/office/drawing/2014/main" id="{4680D9E0-812C-6C2B-A8A6-7D387053B09F}"/>
-              </a:ext>
-            </a:extLst>
-          </p:cNvPr>
+          <p:cNvPr id="5" name="Footer Placeholder 4"/>
           <p:cNvSpPr>
             <a:spLocks noGrp="1"/>
           </p:cNvSpPr>
@@ -2928,8 +2595,8 @@
         </p:nvSpPr>
         <p:spPr>
           <a:xfrm>
-            <a:off x="4038600" y="6356350"/>
-            <a:ext cx="4114800" cy="365125"/>
+            <a:off x="2271713" y="6356352"/>
+            <a:ext cx="2314575" cy="365125"/>
           </a:xfrm>
           <a:prstGeom prst="rect">
             <a:avLst/>
@@ -2939,7 +2606,7 @@
           <a:bodyPr vert="horz" lIns="91440" tIns="45720" rIns="91440" bIns="45720" rtlCol="0" anchor="ctr"/>
           <a:lstStyle>
             <a:lvl1pPr algn="ctr">
-              <a:defRPr sz="1200">
+              <a:defRPr sz="900">
                 <a:solidFill>
                   <a:schemeClr val="tx1">
                     <a:tint val="75000"/>
@@ -2955,13 +2622,7 @@
       </p:sp>
       <p:sp>
         <p:nvSpPr>
-          <p:cNvPr id="6" name="Slide Number Placeholder 5">
-            <a:extLst>
-              <a:ext uri="{FF2B5EF4-FFF2-40B4-BE49-F238E27FC236}">
-                <a16:creationId xmlns:a16="http://schemas.microsoft.com/office/drawing/2014/main" id="{5A9E6005-D5B6-E313-5DAF-68E59538B541}"/>
-              </a:ext>
-            </a:extLst>
-          </p:cNvPr>
+          <p:cNvPr id="6" name="Slide Number Placeholder 5"/>
           <p:cNvSpPr>
             <a:spLocks noGrp="1"/>
           </p:cNvSpPr>
@@ -2971,8 +2632,8 @@
         </p:nvSpPr>
         <p:spPr>
           <a:xfrm>
-            <a:off x="8610600" y="6356350"/>
-            <a:ext cx="2743200" cy="365125"/>
+            <a:off x="4843463" y="6356352"/>
+            <a:ext cx="1543050" cy="365125"/>
           </a:xfrm>
           <a:prstGeom prst="rect">
             <a:avLst/>
@@ -2982,7 +2643,7 @@
           <a:bodyPr vert="horz" lIns="91440" tIns="45720" rIns="91440" bIns="45720" rtlCol="0" anchor="ctr"/>
           <a:lstStyle>
             <a:lvl1pPr algn="r">
-              <a:defRPr sz="1200">
+              <a:defRPr sz="900">
                 <a:solidFill>
                   <a:schemeClr val="tx1">
                     <a:tint val="75000"/>
@@ -3003,27 +2664,27 @@
     </p:spTree>
     <p:extLst>
       <p:ext uri="{BB962C8B-B14F-4D97-AF65-F5344CB8AC3E}">
-        <p14:creationId xmlns:p14="http://schemas.microsoft.com/office/powerpoint/2010/main" val="2445902914"/>
+        <p14:creationId xmlns:p14="http://schemas.microsoft.com/office/powerpoint/2010/main" val="1125289526"/>
       </p:ext>
     </p:extLst>
   </p:cSld>
   <p:clrMap bg1="lt1" tx1="dk1" bg2="lt2" tx2="dk2" accent1="accent1" accent2="accent2" accent3="accent3" accent4="accent4" accent5="accent5" accent6="accent6" hlink="hlink" folHlink="folHlink"/>
   <p:sldLayoutIdLst>
-    <p:sldLayoutId id="2147483649" r:id="rId1"/>
-    <p:sldLayoutId id="2147483650" r:id="rId2"/>
-    <p:sldLayoutId id="2147483651" r:id="rId3"/>
-    <p:sldLayoutId id="2147483652" r:id="rId4"/>
-    <p:sldLayoutId id="2147483653" r:id="rId5"/>
-    <p:sldLayoutId id="2147483654" r:id="rId6"/>
-    <p:sldLayoutId id="2147483655" r:id="rId7"/>
-    <p:sldLayoutId id="2147483656" r:id="rId8"/>
-    <p:sldLayoutId id="2147483657" r:id="rId9"/>
-    <p:sldLayoutId id="2147483658" r:id="rId10"/>
-    <p:sldLayoutId id="2147483659" r:id="rId11"/>
+    <p:sldLayoutId id="2147483661" r:id="rId1"/>
+    <p:sldLayoutId id="2147483662" r:id="rId2"/>
+    <p:sldLayoutId id="2147483663" r:id="rId3"/>
+    <p:sldLayoutId id="2147483664" r:id="rId4"/>
+    <p:sldLayoutId id="2147483665" r:id="rId5"/>
+    <p:sldLayoutId id="2147483666" r:id="rId6"/>
+    <p:sldLayoutId id="2147483667" r:id="rId7"/>
+    <p:sldLayoutId id="2147483668" r:id="rId8"/>
+    <p:sldLayoutId id="2147483669" r:id="rId9"/>
+    <p:sldLayoutId id="2147483670" r:id="rId10"/>
+    <p:sldLayoutId id="2147483671" r:id="rId11"/>
   </p:sldLayoutIdLst>
   <p:txStyles>
     <p:titleStyle>
-      <a:lvl1pPr algn="l" defTabSz="914400" rtl="0" eaLnBrk="1" latinLnBrk="0" hangingPunct="1">
+      <a:lvl1pPr algn="l" defTabSz="685800" rtl="0" eaLnBrk="1" latinLnBrk="0" hangingPunct="1">
         <a:lnSpc>
           <a:spcPct val="90000"/>
         </a:lnSpc>
@@ -3031,7 +2692,7 @@
           <a:spcPct val="0"/>
         </a:spcBef>
         <a:buNone/>
-        <a:defRPr sz="4400" kern="1200">
+        <a:defRPr sz="3300" kern="1200">
           <a:solidFill>
             <a:schemeClr val="tx1"/>
           </a:solidFill>
@@ -3042,16 +2703,16 @@
       </a:lvl1pPr>
     </p:titleStyle>
     <p:bodyStyle>
-      <a:lvl1pPr marL="228600" indent="-228600" algn="l" defTabSz="914400" rtl="0" eaLnBrk="1" latinLnBrk="0" hangingPunct="1">
+      <a:lvl1pPr marL="171450" indent="-171450" algn="l" defTabSz="685800" rtl="0" eaLnBrk="1" latinLnBrk="0" hangingPunct="1">
         <a:lnSpc>
           <a:spcPct val="90000"/>
         </a:lnSpc>
         <a:spcBef>
-          <a:spcPts val="1000"/>
+          <a:spcPts val="750"/>
         </a:spcBef>
         <a:buFont typeface="Arial" panose="020B0604020202020204" pitchFamily="34" charset="0"/>
         <a:buChar char="•"/>
-        <a:defRPr sz="2800" kern="1200">
+        <a:defRPr sz="2100" kern="1200">
           <a:solidFill>
             <a:schemeClr val="tx1"/>
           </a:solidFill>
@@ -3060,48 +2721,12 @@
           <a:cs typeface="+mn-cs"/>
         </a:defRPr>
       </a:lvl1pPr>
-      <a:lvl2pPr marL="685800" indent="-228600" algn="l" defTabSz="914400" rtl="0" eaLnBrk="1" latinLnBrk="0" hangingPunct="1">
+      <a:lvl2pPr marL="514350" indent="-171450" algn="l" defTabSz="685800" rtl="0" eaLnBrk="1" latinLnBrk="0" hangingPunct="1">
         <a:lnSpc>
           <a:spcPct val="90000"/>
         </a:lnSpc>
         <a:spcBef>
-          <a:spcPts val="500"/>
-        </a:spcBef>
-        <a:buFont typeface="Arial" panose="020B0604020202020204" pitchFamily="34" charset="0"/>
-        <a:buChar char="•"/>
-        <a:defRPr sz="2400" kern="1200">
-          <a:solidFill>
-            <a:schemeClr val="tx1"/>
-          </a:solidFill>
-          <a:latin typeface="+mn-lt"/>
-          <a:ea typeface="+mn-ea"/>
-          <a:cs typeface="+mn-cs"/>
-        </a:defRPr>
-      </a:lvl2pPr>
-      <a:lvl3pPr marL="1143000" indent="-228600" algn="l" defTabSz="914400" rtl="0" eaLnBrk="1" latinLnBrk="0" hangingPunct="1">
-        <a:lnSpc>
-          <a:spcPct val="90000"/>
-        </a:lnSpc>
-        <a:spcBef>
-          <a:spcPts val="500"/>
-        </a:spcBef>
-        <a:buFont typeface="Arial" panose="020B0604020202020204" pitchFamily="34" charset="0"/>
-        <a:buChar char="•"/>
-        <a:defRPr sz="2000" kern="1200">
-          <a:solidFill>
-            <a:schemeClr val="tx1"/>
-          </a:solidFill>
-          <a:latin typeface="+mn-lt"/>
-          <a:ea typeface="+mn-ea"/>
-          <a:cs typeface="+mn-cs"/>
-        </a:defRPr>
-      </a:lvl3pPr>
-      <a:lvl4pPr marL="1600200" indent="-228600" algn="l" defTabSz="914400" rtl="0" eaLnBrk="1" latinLnBrk="0" hangingPunct="1">
-        <a:lnSpc>
-          <a:spcPct val="90000"/>
-        </a:lnSpc>
-        <a:spcBef>
-          <a:spcPts val="500"/>
+          <a:spcPts val="375"/>
         </a:spcBef>
         <a:buFont typeface="Arial" panose="020B0604020202020204" pitchFamily="34" charset="0"/>
         <a:buChar char="•"/>
@@ -3113,17 +2738,53 @@
           <a:ea typeface="+mn-ea"/>
           <a:cs typeface="+mn-cs"/>
         </a:defRPr>
-      </a:lvl4pPr>
-      <a:lvl5pPr marL="2057400" indent="-228600" algn="l" defTabSz="914400" rtl="0" eaLnBrk="1" latinLnBrk="0" hangingPunct="1">
+      </a:lvl2pPr>
+      <a:lvl3pPr marL="857250" indent="-171450" algn="l" defTabSz="685800" rtl="0" eaLnBrk="1" latinLnBrk="0" hangingPunct="1">
         <a:lnSpc>
           <a:spcPct val="90000"/>
         </a:lnSpc>
         <a:spcBef>
-          <a:spcPts val="500"/>
+          <a:spcPts val="375"/>
         </a:spcBef>
         <a:buFont typeface="Arial" panose="020B0604020202020204" pitchFamily="34" charset="0"/>
         <a:buChar char="•"/>
-        <a:defRPr sz="1800" kern="1200">
+        <a:defRPr sz="1500" kern="1200">
+          <a:solidFill>
+            <a:schemeClr val="tx1"/>
+          </a:solidFill>
+          <a:latin typeface="+mn-lt"/>
+          <a:ea typeface="+mn-ea"/>
+          <a:cs typeface="+mn-cs"/>
+        </a:defRPr>
+      </a:lvl3pPr>
+      <a:lvl4pPr marL="1200150" indent="-171450" algn="l" defTabSz="685800" rtl="0" eaLnBrk="1" latinLnBrk="0" hangingPunct="1">
+        <a:lnSpc>
+          <a:spcPct val="90000"/>
+        </a:lnSpc>
+        <a:spcBef>
+          <a:spcPts val="375"/>
+        </a:spcBef>
+        <a:buFont typeface="Arial" panose="020B0604020202020204" pitchFamily="34" charset="0"/>
+        <a:buChar char="•"/>
+        <a:defRPr sz="1350" kern="1200">
+          <a:solidFill>
+            <a:schemeClr val="tx1"/>
+          </a:solidFill>
+          <a:latin typeface="+mn-lt"/>
+          <a:ea typeface="+mn-ea"/>
+          <a:cs typeface="+mn-cs"/>
+        </a:defRPr>
+      </a:lvl4pPr>
+      <a:lvl5pPr marL="1543050" indent="-171450" algn="l" defTabSz="685800" rtl="0" eaLnBrk="1" latinLnBrk="0" hangingPunct="1">
+        <a:lnSpc>
+          <a:spcPct val="90000"/>
+        </a:lnSpc>
+        <a:spcBef>
+          <a:spcPts val="375"/>
+        </a:spcBef>
+        <a:buFont typeface="Arial" panose="020B0604020202020204" pitchFamily="34" charset="0"/>
+        <a:buChar char="•"/>
+        <a:defRPr sz="1350" kern="1200">
           <a:solidFill>
             <a:schemeClr val="tx1"/>
           </a:solidFill>
@@ -3132,16 +2793,16 @@
           <a:cs typeface="+mn-cs"/>
         </a:defRPr>
       </a:lvl5pPr>
-      <a:lvl6pPr marL="2514600" indent="-228600" algn="l" defTabSz="914400" rtl="0" eaLnBrk="1" latinLnBrk="0" hangingPunct="1">
+      <a:lvl6pPr marL="1885950" indent="-171450" algn="l" defTabSz="685800" rtl="0" eaLnBrk="1" latinLnBrk="0" hangingPunct="1">
         <a:lnSpc>
           <a:spcPct val="90000"/>
         </a:lnSpc>
         <a:spcBef>
-          <a:spcPts val="500"/>
+          <a:spcPts val="375"/>
         </a:spcBef>
         <a:buFont typeface="Arial" panose="020B0604020202020204" pitchFamily="34" charset="0"/>
         <a:buChar char="•"/>
-        <a:defRPr sz="1800" kern="1200">
+        <a:defRPr sz="1350" kern="1200">
           <a:solidFill>
             <a:schemeClr val="tx1"/>
           </a:solidFill>
@@ -3150,16 +2811,16 @@
           <a:cs typeface="+mn-cs"/>
         </a:defRPr>
       </a:lvl6pPr>
-      <a:lvl7pPr marL="2971800" indent="-228600" algn="l" defTabSz="914400" rtl="0" eaLnBrk="1" latinLnBrk="0" hangingPunct="1">
+      <a:lvl7pPr marL="2228850" indent="-171450" algn="l" defTabSz="685800" rtl="0" eaLnBrk="1" latinLnBrk="0" hangingPunct="1">
         <a:lnSpc>
           <a:spcPct val="90000"/>
         </a:lnSpc>
         <a:spcBef>
-          <a:spcPts val="500"/>
+          <a:spcPts val="375"/>
         </a:spcBef>
         <a:buFont typeface="Arial" panose="020B0604020202020204" pitchFamily="34" charset="0"/>
         <a:buChar char="•"/>
-        <a:defRPr sz="1800" kern="1200">
+        <a:defRPr sz="1350" kern="1200">
           <a:solidFill>
             <a:schemeClr val="tx1"/>
           </a:solidFill>
@@ -3168,16 +2829,16 @@
           <a:cs typeface="+mn-cs"/>
         </a:defRPr>
       </a:lvl7pPr>
-      <a:lvl8pPr marL="3429000" indent="-228600" algn="l" defTabSz="914400" rtl="0" eaLnBrk="1" latinLnBrk="0" hangingPunct="1">
+      <a:lvl8pPr marL="2571750" indent="-171450" algn="l" defTabSz="685800" rtl="0" eaLnBrk="1" latinLnBrk="0" hangingPunct="1">
         <a:lnSpc>
           <a:spcPct val="90000"/>
         </a:lnSpc>
         <a:spcBef>
-          <a:spcPts val="500"/>
+          <a:spcPts val="375"/>
         </a:spcBef>
         <a:buFont typeface="Arial" panose="020B0604020202020204" pitchFamily="34" charset="0"/>
         <a:buChar char="•"/>
-        <a:defRPr sz="1800" kern="1200">
+        <a:defRPr sz="1350" kern="1200">
           <a:solidFill>
             <a:schemeClr val="tx1"/>
           </a:solidFill>
@@ -3186,16 +2847,16 @@
           <a:cs typeface="+mn-cs"/>
         </a:defRPr>
       </a:lvl8pPr>
-      <a:lvl9pPr marL="3886200" indent="-228600" algn="l" defTabSz="914400" rtl="0" eaLnBrk="1" latinLnBrk="0" hangingPunct="1">
+      <a:lvl9pPr marL="2914650" indent="-171450" algn="l" defTabSz="685800" rtl="0" eaLnBrk="1" latinLnBrk="0" hangingPunct="1">
         <a:lnSpc>
           <a:spcPct val="90000"/>
         </a:lnSpc>
         <a:spcBef>
-          <a:spcPts val="500"/>
+          <a:spcPts val="375"/>
         </a:spcBef>
         <a:buFont typeface="Arial" panose="020B0604020202020204" pitchFamily="34" charset="0"/>
         <a:buChar char="•"/>
-        <a:defRPr sz="1800" kern="1200">
+        <a:defRPr sz="1350" kern="1200">
           <a:solidFill>
             <a:schemeClr val="tx1"/>
           </a:solidFill>
@@ -3209,8 +2870,8 @@
       <a:defPPr>
         <a:defRPr lang="en-US"/>
       </a:defPPr>
-      <a:lvl1pPr marL="0" algn="l" defTabSz="914400" rtl="0" eaLnBrk="1" latinLnBrk="0" hangingPunct="1">
-        <a:defRPr sz="1800" kern="1200">
+      <a:lvl1pPr marL="0" algn="l" defTabSz="685800" rtl="0" eaLnBrk="1" latinLnBrk="0" hangingPunct="1">
+        <a:defRPr sz="1350" kern="1200">
           <a:solidFill>
             <a:schemeClr val="tx1"/>
           </a:solidFill>
@@ -3219,8 +2880,8 @@
           <a:cs typeface="+mn-cs"/>
         </a:defRPr>
       </a:lvl1pPr>
-      <a:lvl2pPr marL="457200" algn="l" defTabSz="914400" rtl="0" eaLnBrk="1" latinLnBrk="0" hangingPunct="1">
-        <a:defRPr sz="1800" kern="1200">
+      <a:lvl2pPr marL="342900" algn="l" defTabSz="685800" rtl="0" eaLnBrk="1" latinLnBrk="0" hangingPunct="1">
+        <a:defRPr sz="1350" kern="1200">
           <a:solidFill>
             <a:schemeClr val="tx1"/>
           </a:solidFill>
@@ -3229,8 +2890,8 @@
           <a:cs typeface="+mn-cs"/>
         </a:defRPr>
       </a:lvl2pPr>
-      <a:lvl3pPr marL="914400" algn="l" defTabSz="914400" rtl="0" eaLnBrk="1" latinLnBrk="0" hangingPunct="1">
-        <a:defRPr sz="1800" kern="1200">
+      <a:lvl3pPr marL="685800" algn="l" defTabSz="685800" rtl="0" eaLnBrk="1" latinLnBrk="0" hangingPunct="1">
+        <a:defRPr sz="1350" kern="1200">
           <a:solidFill>
             <a:schemeClr val="tx1"/>
           </a:solidFill>
@@ -3239,8 +2900,8 @@
           <a:cs typeface="+mn-cs"/>
         </a:defRPr>
       </a:lvl3pPr>
-      <a:lvl4pPr marL="1371600" algn="l" defTabSz="914400" rtl="0" eaLnBrk="1" latinLnBrk="0" hangingPunct="1">
-        <a:defRPr sz="1800" kern="1200">
+      <a:lvl4pPr marL="1028700" algn="l" defTabSz="685800" rtl="0" eaLnBrk="1" latinLnBrk="0" hangingPunct="1">
+        <a:defRPr sz="1350" kern="1200">
           <a:solidFill>
             <a:schemeClr val="tx1"/>
           </a:solidFill>
@@ -3249,8 +2910,8 @@
           <a:cs typeface="+mn-cs"/>
         </a:defRPr>
       </a:lvl4pPr>
-      <a:lvl5pPr marL="1828800" algn="l" defTabSz="914400" rtl="0" eaLnBrk="1" latinLnBrk="0" hangingPunct="1">
-        <a:defRPr sz="1800" kern="1200">
+      <a:lvl5pPr marL="1371600" algn="l" defTabSz="685800" rtl="0" eaLnBrk="1" latinLnBrk="0" hangingPunct="1">
+        <a:defRPr sz="1350" kern="1200">
           <a:solidFill>
             <a:schemeClr val="tx1"/>
           </a:solidFill>
@@ -3259,8 +2920,8 @@
           <a:cs typeface="+mn-cs"/>
         </a:defRPr>
       </a:lvl5pPr>
-      <a:lvl6pPr marL="2286000" algn="l" defTabSz="914400" rtl="0" eaLnBrk="1" latinLnBrk="0" hangingPunct="1">
-        <a:defRPr sz="1800" kern="1200">
+      <a:lvl6pPr marL="1714500" algn="l" defTabSz="685800" rtl="0" eaLnBrk="1" latinLnBrk="0" hangingPunct="1">
+        <a:defRPr sz="1350" kern="1200">
           <a:solidFill>
             <a:schemeClr val="tx1"/>
           </a:solidFill>
@@ -3269,8 +2930,8 @@
           <a:cs typeface="+mn-cs"/>
         </a:defRPr>
       </a:lvl6pPr>
-      <a:lvl7pPr marL="2743200" algn="l" defTabSz="914400" rtl="0" eaLnBrk="1" latinLnBrk="0" hangingPunct="1">
-        <a:defRPr sz="1800" kern="1200">
+      <a:lvl7pPr marL="2057400" algn="l" defTabSz="685800" rtl="0" eaLnBrk="1" latinLnBrk="0" hangingPunct="1">
+        <a:defRPr sz="1350" kern="1200">
           <a:solidFill>
             <a:schemeClr val="tx1"/>
           </a:solidFill>
@@ -3279,8 +2940,8 @@
           <a:cs typeface="+mn-cs"/>
         </a:defRPr>
       </a:lvl7pPr>
-      <a:lvl8pPr marL="3200400" algn="l" defTabSz="914400" rtl="0" eaLnBrk="1" latinLnBrk="0" hangingPunct="1">
-        <a:defRPr sz="1800" kern="1200">
+      <a:lvl8pPr marL="2400300" algn="l" defTabSz="685800" rtl="0" eaLnBrk="1" latinLnBrk="0" hangingPunct="1">
+        <a:defRPr sz="1350" kern="1200">
           <a:solidFill>
             <a:schemeClr val="tx1"/>
           </a:solidFill>
@@ -3289,8 +2950,8 @@
           <a:cs typeface="+mn-cs"/>
         </a:defRPr>
       </a:lvl8pPr>
-      <a:lvl9pPr marL="3657600" algn="l" defTabSz="914400" rtl="0" eaLnBrk="1" latinLnBrk="0" hangingPunct="1">
-        <a:defRPr sz="1800" kern="1200">
+      <a:lvl9pPr marL="2743200" algn="l" defTabSz="685800" rtl="0" eaLnBrk="1" latinLnBrk="0" hangingPunct="1">
+        <a:defRPr sz="1350" kern="1200">
           <a:solidFill>
             <a:schemeClr val="tx1"/>
           </a:solidFill>
@@ -3307,6 +2968,14 @@
 <file path=ppt/slides/slide1.xml><?xml version="1.0" encoding="utf-8"?>
 <p:sld xmlns:a="http://schemas.openxmlformats.org/drawingml/2006/main" xmlns:r="http://schemas.openxmlformats.org/officeDocument/2006/relationships" xmlns:p="http://schemas.openxmlformats.org/presentationml/2006/main">
   <p:cSld>
+    <p:bg>
+      <p:bgPr>
+        <a:solidFill>
+          <a:schemeClr val="accent1"/>
+        </a:solidFill>
+        <a:effectLst/>
+      </p:bgPr>
+    </p:bg>
     <p:spTree>
       <p:nvGrpSpPr>
         <p:cNvPr id="1" name=""/>
@@ -3321,56 +2990,6 @@
           <a:chExt cx="0" cy="0"/>
         </a:xfrm>
       </p:grpSpPr>
-      <p:sp>
-        <p:nvSpPr>
-          <p:cNvPr id="2" name="Title 1">
-            <a:extLst>
-              <a:ext uri="{FF2B5EF4-FFF2-40B4-BE49-F238E27FC236}">
-                <a16:creationId xmlns:a16="http://schemas.microsoft.com/office/drawing/2014/main" id="{D1BDDB19-6B14-C966-C6DE-6CFE0A0417C5}"/>
-              </a:ext>
-            </a:extLst>
-          </p:cNvPr>
-          <p:cNvSpPr>
-            <a:spLocks noGrp="1"/>
-          </p:cNvSpPr>
-          <p:nvPr>
-            <p:ph type="ctrTitle"/>
-          </p:nvPr>
-        </p:nvSpPr>
-        <p:spPr/>
-        <p:txBody>
-          <a:bodyPr/>
-          <a:lstStyle/>
-          <a:p>
-            <a:endParaRPr lang="en-US"/>
-          </a:p>
-        </p:txBody>
-      </p:sp>
-      <p:sp>
-        <p:nvSpPr>
-          <p:cNvPr id="3" name="Subtitle 2">
-            <a:extLst>
-              <a:ext uri="{FF2B5EF4-FFF2-40B4-BE49-F238E27FC236}">
-                <a16:creationId xmlns:a16="http://schemas.microsoft.com/office/drawing/2014/main" id="{028D227A-4C55-1656-8A67-3331BFF61772}"/>
-              </a:ext>
-            </a:extLst>
-          </p:cNvPr>
-          <p:cNvSpPr>
-            <a:spLocks noGrp="1"/>
-          </p:cNvSpPr>
-          <p:nvPr>
-            <p:ph type="subTitle" idx="1"/>
-          </p:nvPr>
-        </p:nvSpPr>
-        <p:spPr/>
-        <p:txBody>
-          <a:bodyPr/>
-          <a:lstStyle/>
-          <a:p>
-            <a:endParaRPr lang="en-US"/>
-          </a:p>
-        </p:txBody>
-      </p:sp>
     </p:spTree>
     <p:extLst>
       <p:ext uri="{BB962C8B-B14F-4D97-AF65-F5344CB8AC3E}">
@@ -3384,10 +3003,428 @@
 </p:sld>
 </file>
 
+<file path=ppt/slides/slide10.xml><?xml version="1.0" encoding="utf-8"?>
+<p:sld xmlns:a="http://schemas.openxmlformats.org/drawingml/2006/main" xmlns:r="http://schemas.openxmlformats.org/officeDocument/2006/relationships" xmlns:p="http://schemas.openxmlformats.org/presentationml/2006/main">
+  <p:cSld>
+    <p:bg>
+      <p:bgPr>
+        <a:solidFill>
+          <a:schemeClr val="accent2"/>
+        </a:solidFill>
+        <a:effectLst/>
+      </p:bgPr>
+    </p:bg>
+    <p:spTree>
+      <p:nvGrpSpPr>
+        <p:cNvPr id="1" name=""/>
+        <p:cNvGrpSpPr/>
+        <p:nvPr/>
+      </p:nvGrpSpPr>
+      <p:grpSpPr>
+        <a:xfrm>
+          <a:off x="0" y="0"/>
+          <a:ext cx="0" cy="0"/>
+          <a:chOff x="0" y="0"/>
+          <a:chExt cx="0" cy="0"/>
+        </a:xfrm>
+      </p:grpSpPr>
+    </p:spTree>
+    <p:extLst>
+      <p:ext uri="{BB962C8B-B14F-4D97-AF65-F5344CB8AC3E}">
+        <p14:creationId xmlns:p14="http://schemas.microsoft.com/office/powerpoint/2010/main" val="482481611"/>
+      </p:ext>
+    </p:extLst>
+  </p:cSld>
+  <p:clrMapOvr>
+    <a:masterClrMapping/>
+  </p:clrMapOvr>
+</p:sld>
+</file>
+
+<file path=ppt/slides/slide11.xml><?xml version="1.0" encoding="utf-8"?>
+<p:sld xmlns:a="http://schemas.openxmlformats.org/drawingml/2006/main" xmlns:r="http://schemas.openxmlformats.org/officeDocument/2006/relationships" xmlns:p="http://schemas.openxmlformats.org/presentationml/2006/main">
+  <p:cSld>
+    <p:bg>
+      <p:bgPr>
+        <a:solidFill>
+          <a:schemeClr val="accent2"/>
+        </a:solidFill>
+        <a:effectLst/>
+      </p:bgPr>
+    </p:bg>
+    <p:spTree>
+      <p:nvGrpSpPr>
+        <p:cNvPr id="1" name=""/>
+        <p:cNvGrpSpPr/>
+        <p:nvPr/>
+      </p:nvGrpSpPr>
+      <p:grpSpPr>
+        <a:xfrm>
+          <a:off x="0" y="0"/>
+          <a:ext cx="0" cy="0"/>
+          <a:chOff x="0" y="0"/>
+          <a:chExt cx="0" cy="0"/>
+        </a:xfrm>
+      </p:grpSpPr>
+    </p:spTree>
+    <p:extLst>
+      <p:ext uri="{BB962C8B-B14F-4D97-AF65-F5344CB8AC3E}">
+        <p14:creationId xmlns:p14="http://schemas.microsoft.com/office/powerpoint/2010/main" val="1866757579"/>
+      </p:ext>
+    </p:extLst>
+  </p:cSld>
+  <p:clrMapOvr>
+    <a:masterClrMapping/>
+  </p:clrMapOvr>
+</p:sld>
+</file>
+
+<file path=ppt/slides/slide12.xml><?xml version="1.0" encoding="utf-8"?>
+<p:sld xmlns:a="http://schemas.openxmlformats.org/drawingml/2006/main" xmlns:r="http://schemas.openxmlformats.org/officeDocument/2006/relationships" xmlns:p="http://schemas.openxmlformats.org/presentationml/2006/main">
+  <p:cSld>
+    <p:bg>
+      <p:bgPr>
+        <a:solidFill>
+          <a:schemeClr val="accent1"/>
+        </a:solidFill>
+        <a:effectLst/>
+      </p:bgPr>
+    </p:bg>
+    <p:spTree>
+      <p:nvGrpSpPr>
+        <p:cNvPr id="1" name=""/>
+        <p:cNvGrpSpPr/>
+        <p:nvPr/>
+      </p:nvGrpSpPr>
+      <p:grpSpPr>
+        <a:xfrm>
+          <a:off x="0" y="0"/>
+          <a:ext cx="0" cy="0"/>
+          <a:chOff x="0" y="0"/>
+          <a:chExt cx="0" cy="0"/>
+        </a:xfrm>
+      </p:grpSpPr>
+    </p:spTree>
+    <p:extLst>
+      <p:ext uri="{BB962C8B-B14F-4D97-AF65-F5344CB8AC3E}">
+        <p14:creationId xmlns:p14="http://schemas.microsoft.com/office/powerpoint/2010/main" val="974869061"/>
+      </p:ext>
+    </p:extLst>
+  </p:cSld>
+  <p:clrMapOvr>
+    <a:masterClrMapping/>
+  </p:clrMapOvr>
+</p:sld>
+</file>
+
+<file path=ppt/slides/slide2.xml><?xml version="1.0" encoding="utf-8"?>
+<p:sld xmlns:a="http://schemas.openxmlformats.org/drawingml/2006/main" xmlns:r="http://schemas.openxmlformats.org/officeDocument/2006/relationships" xmlns:p="http://schemas.openxmlformats.org/presentationml/2006/main">
+  <p:cSld>
+    <p:bg>
+      <p:bgPr>
+        <a:solidFill>
+          <a:schemeClr val="accent2"/>
+        </a:solidFill>
+        <a:effectLst/>
+      </p:bgPr>
+    </p:bg>
+    <p:spTree>
+      <p:nvGrpSpPr>
+        <p:cNvPr id="1" name=""/>
+        <p:cNvGrpSpPr/>
+        <p:nvPr/>
+      </p:nvGrpSpPr>
+      <p:grpSpPr>
+        <a:xfrm>
+          <a:off x="0" y="0"/>
+          <a:ext cx="0" cy="0"/>
+          <a:chOff x="0" y="0"/>
+          <a:chExt cx="0" cy="0"/>
+        </a:xfrm>
+      </p:grpSpPr>
+    </p:spTree>
+    <p:extLst>
+      <p:ext uri="{BB962C8B-B14F-4D97-AF65-F5344CB8AC3E}">
+        <p14:creationId xmlns:p14="http://schemas.microsoft.com/office/powerpoint/2010/main" val="425797310"/>
+      </p:ext>
+    </p:extLst>
+  </p:cSld>
+  <p:clrMapOvr>
+    <a:masterClrMapping/>
+  </p:clrMapOvr>
+</p:sld>
+</file>
+
+<file path=ppt/slides/slide3.xml><?xml version="1.0" encoding="utf-8"?>
+<p:sld xmlns:a="http://schemas.openxmlformats.org/drawingml/2006/main" xmlns:r="http://schemas.openxmlformats.org/officeDocument/2006/relationships" xmlns:p="http://schemas.openxmlformats.org/presentationml/2006/main">
+  <p:cSld>
+    <p:bg>
+      <p:bgPr>
+        <a:solidFill>
+          <a:schemeClr val="accent1"/>
+        </a:solidFill>
+        <a:effectLst/>
+      </p:bgPr>
+    </p:bg>
+    <p:spTree>
+      <p:nvGrpSpPr>
+        <p:cNvPr id="1" name=""/>
+        <p:cNvGrpSpPr/>
+        <p:nvPr/>
+      </p:nvGrpSpPr>
+      <p:grpSpPr>
+        <a:xfrm>
+          <a:off x="0" y="0"/>
+          <a:ext cx="0" cy="0"/>
+          <a:chOff x="0" y="0"/>
+          <a:chExt cx="0" cy="0"/>
+        </a:xfrm>
+      </p:grpSpPr>
+    </p:spTree>
+    <p:extLst>
+      <p:ext uri="{BB962C8B-B14F-4D97-AF65-F5344CB8AC3E}">
+        <p14:creationId xmlns:p14="http://schemas.microsoft.com/office/powerpoint/2010/main" val="3687031670"/>
+      </p:ext>
+    </p:extLst>
+  </p:cSld>
+  <p:clrMapOvr>
+    <a:masterClrMapping/>
+  </p:clrMapOvr>
+</p:sld>
+</file>
+
+<file path=ppt/slides/slide4.xml><?xml version="1.0" encoding="utf-8"?>
+<p:sld xmlns:a="http://schemas.openxmlformats.org/drawingml/2006/main" xmlns:r="http://schemas.openxmlformats.org/officeDocument/2006/relationships" xmlns:p="http://schemas.openxmlformats.org/presentationml/2006/main">
+  <p:cSld>
+    <p:bg>
+      <p:bgPr>
+        <a:solidFill>
+          <a:schemeClr val="accent1"/>
+        </a:solidFill>
+        <a:effectLst/>
+      </p:bgPr>
+    </p:bg>
+    <p:spTree>
+      <p:nvGrpSpPr>
+        <p:cNvPr id="1" name=""/>
+        <p:cNvGrpSpPr/>
+        <p:nvPr/>
+      </p:nvGrpSpPr>
+      <p:grpSpPr>
+        <a:xfrm>
+          <a:off x="0" y="0"/>
+          <a:ext cx="0" cy="0"/>
+          <a:chOff x="0" y="0"/>
+          <a:chExt cx="0" cy="0"/>
+        </a:xfrm>
+      </p:grpSpPr>
+    </p:spTree>
+    <p:extLst>
+      <p:ext uri="{BB962C8B-B14F-4D97-AF65-F5344CB8AC3E}">
+        <p14:creationId xmlns:p14="http://schemas.microsoft.com/office/powerpoint/2010/main" val="3347621455"/>
+      </p:ext>
+    </p:extLst>
+  </p:cSld>
+  <p:clrMapOvr>
+    <a:masterClrMapping/>
+  </p:clrMapOvr>
+</p:sld>
+</file>
+
+<file path=ppt/slides/slide5.xml><?xml version="1.0" encoding="utf-8"?>
+<p:sld xmlns:a="http://schemas.openxmlformats.org/drawingml/2006/main" xmlns:r="http://schemas.openxmlformats.org/officeDocument/2006/relationships" xmlns:p="http://schemas.openxmlformats.org/presentationml/2006/main">
+  <p:cSld>
+    <p:bg>
+      <p:bgPr>
+        <a:solidFill>
+          <a:schemeClr val="accent2"/>
+        </a:solidFill>
+        <a:effectLst/>
+      </p:bgPr>
+    </p:bg>
+    <p:spTree>
+      <p:nvGrpSpPr>
+        <p:cNvPr id="1" name=""/>
+        <p:cNvGrpSpPr/>
+        <p:nvPr/>
+      </p:nvGrpSpPr>
+      <p:grpSpPr>
+        <a:xfrm>
+          <a:off x="0" y="0"/>
+          <a:ext cx="0" cy="0"/>
+          <a:chOff x="0" y="0"/>
+          <a:chExt cx="0" cy="0"/>
+        </a:xfrm>
+      </p:grpSpPr>
+    </p:spTree>
+    <p:extLst>
+      <p:ext uri="{BB962C8B-B14F-4D97-AF65-F5344CB8AC3E}">
+        <p14:creationId xmlns:p14="http://schemas.microsoft.com/office/powerpoint/2010/main" val="3139844112"/>
+      </p:ext>
+    </p:extLst>
+  </p:cSld>
+  <p:clrMapOvr>
+    <a:masterClrMapping/>
+  </p:clrMapOvr>
+</p:sld>
+</file>
+
+<file path=ppt/slides/slide6.xml><?xml version="1.0" encoding="utf-8"?>
+<p:sld xmlns:a="http://schemas.openxmlformats.org/drawingml/2006/main" xmlns:r="http://schemas.openxmlformats.org/officeDocument/2006/relationships" xmlns:p="http://schemas.openxmlformats.org/presentationml/2006/main">
+  <p:cSld>
+    <p:bg>
+      <p:bgPr>
+        <a:solidFill>
+          <a:schemeClr val="accent2"/>
+        </a:solidFill>
+        <a:effectLst/>
+      </p:bgPr>
+    </p:bg>
+    <p:spTree>
+      <p:nvGrpSpPr>
+        <p:cNvPr id="1" name=""/>
+        <p:cNvGrpSpPr/>
+        <p:nvPr/>
+      </p:nvGrpSpPr>
+      <p:grpSpPr>
+        <a:xfrm>
+          <a:off x="0" y="0"/>
+          <a:ext cx="0" cy="0"/>
+          <a:chOff x="0" y="0"/>
+          <a:chExt cx="0" cy="0"/>
+        </a:xfrm>
+      </p:grpSpPr>
+    </p:spTree>
+    <p:extLst>
+      <p:ext uri="{BB962C8B-B14F-4D97-AF65-F5344CB8AC3E}">
+        <p14:creationId xmlns:p14="http://schemas.microsoft.com/office/powerpoint/2010/main" val="2179054175"/>
+      </p:ext>
+    </p:extLst>
+  </p:cSld>
+  <p:clrMapOvr>
+    <a:masterClrMapping/>
+  </p:clrMapOvr>
+</p:sld>
+</file>
+
+<file path=ppt/slides/slide7.xml><?xml version="1.0" encoding="utf-8"?>
+<p:sld xmlns:a="http://schemas.openxmlformats.org/drawingml/2006/main" xmlns:r="http://schemas.openxmlformats.org/officeDocument/2006/relationships" xmlns:p="http://schemas.openxmlformats.org/presentationml/2006/main">
+  <p:cSld>
+    <p:bg>
+      <p:bgPr>
+        <a:solidFill>
+          <a:schemeClr val="accent1"/>
+        </a:solidFill>
+        <a:effectLst/>
+      </p:bgPr>
+    </p:bg>
+    <p:spTree>
+      <p:nvGrpSpPr>
+        <p:cNvPr id="1" name=""/>
+        <p:cNvGrpSpPr/>
+        <p:nvPr/>
+      </p:nvGrpSpPr>
+      <p:grpSpPr>
+        <a:xfrm>
+          <a:off x="0" y="0"/>
+          <a:ext cx="0" cy="0"/>
+          <a:chOff x="0" y="0"/>
+          <a:chExt cx="0" cy="0"/>
+        </a:xfrm>
+      </p:grpSpPr>
+    </p:spTree>
+    <p:extLst>
+      <p:ext uri="{BB962C8B-B14F-4D97-AF65-F5344CB8AC3E}">
+        <p14:creationId xmlns:p14="http://schemas.microsoft.com/office/powerpoint/2010/main" val="922214229"/>
+      </p:ext>
+    </p:extLst>
+  </p:cSld>
+  <p:clrMapOvr>
+    <a:masterClrMapping/>
+  </p:clrMapOvr>
+</p:sld>
+</file>
+
+<file path=ppt/slides/slide8.xml><?xml version="1.0" encoding="utf-8"?>
+<p:sld xmlns:a="http://schemas.openxmlformats.org/drawingml/2006/main" xmlns:r="http://schemas.openxmlformats.org/officeDocument/2006/relationships" xmlns:p="http://schemas.openxmlformats.org/presentationml/2006/main">
+  <p:cSld>
+    <p:bg>
+      <p:bgPr>
+        <a:solidFill>
+          <a:schemeClr val="accent2"/>
+        </a:solidFill>
+        <a:effectLst/>
+      </p:bgPr>
+    </p:bg>
+    <p:spTree>
+      <p:nvGrpSpPr>
+        <p:cNvPr id="1" name=""/>
+        <p:cNvGrpSpPr/>
+        <p:nvPr/>
+      </p:nvGrpSpPr>
+      <p:grpSpPr>
+        <a:xfrm>
+          <a:off x="0" y="0"/>
+          <a:ext cx="0" cy="0"/>
+          <a:chOff x="0" y="0"/>
+          <a:chExt cx="0" cy="0"/>
+        </a:xfrm>
+      </p:grpSpPr>
+    </p:spTree>
+    <p:extLst>
+      <p:ext uri="{BB962C8B-B14F-4D97-AF65-F5344CB8AC3E}">
+        <p14:creationId xmlns:p14="http://schemas.microsoft.com/office/powerpoint/2010/main" val="305410309"/>
+      </p:ext>
+    </p:extLst>
+  </p:cSld>
+  <p:clrMapOvr>
+    <a:masterClrMapping/>
+  </p:clrMapOvr>
+</p:sld>
+</file>
+
+<file path=ppt/slides/slide9.xml><?xml version="1.0" encoding="utf-8"?>
+<p:sld xmlns:a="http://schemas.openxmlformats.org/drawingml/2006/main" xmlns:r="http://schemas.openxmlformats.org/officeDocument/2006/relationships" xmlns:p="http://schemas.openxmlformats.org/presentationml/2006/main">
+  <p:cSld>
+    <p:bg>
+      <p:bgPr>
+        <a:solidFill>
+          <a:schemeClr val="accent1"/>
+        </a:solidFill>
+        <a:effectLst/>
+      </p:bgPr>
+    </p:bg>
+    <p:spTree>
+      <p:nvGrpSpPr>
+        <p:cNvPr id="1" name=""/>
+        <p:cNvGrpSpPr/>
+        <p:nvPr/>
+      </p:nvGrpSpPr>
+      <p:grpSpPr>
+        <a:xfrm>
+          <a:off x="0" y="0"/>
+          <a:ext cx="0" cy="0"/>
+          <a:chOff x="0" y="0"/>
+          <a:chExt cx="0" cy="0"/>
+        </a:xfrm>
+      </p:grpSpPr>
+    </p:spTree>
+    <p:extLst>
+      <p:ext uri="{BB962C8B-B14F-4D97-AF65-F5344CB8AC3E}">
+        <p14:creationId xmlns:p14="http://schemas.microsoft.com/office/powerpoint/2010/main" val="446214452"/>
+      </p:ext>
+    </p:extLst>
+  </p:cSld>
+  <p:clrMapOvr>
+    <a:masterClrMapping/>
+  </p:clrMapOvr>
+</p:sld>
+</file>
+
 <file path=ppt/theme/theme1.xml><?xml version="1.0" encoding="utf-8"?>
 <a:theme xmlns:a="http://schemas.openxmlformats.org/drawingml/2006/main" name="Office Theme">
   <a:themeElements>
-    <a:clrScheme name="Office">
+    <a:clrScheme name="Office Theme">
       <a:dk1>
         <a:sysClr val="windowText" lastClr="000000"/>
       </a:dk1>
@@ -3425,7 +3462,7 @@
         <a:srgbClr val="954F72"/>
       </a:folHlink>
     </a:clrScheme>
-    <a:fontScheme name="Office">
+    <a:fontScheme name="Office Theme">
       <a:majorFont>
         <a:latin typeface="Calibri Light" panose="020F0302020204030204"/>
         <a:ea typeface=""/>
@@ -3460,23 +3497,6 @@
         <a:font script="Viet" typeface="Times New Roman"/>
         <a:font script="Uigh" typeface="Microsoft Uighur"/>
         <a:font script="Geor" typeface="Sylfaen"/>
-        <a:font script="Armn" typeface="Arial"/>
-        <a:font script="Bugi" typeface="Leelawadee UI"/>
-        <a:font script="Bopo" typeface="Microsoft JhengHei"/>
-        <a:font script="Java" typeface="Javanese Text"/>
-        <a:font script="Lisu" typeface="Segoe UI"/>
-        <a:font script="Mymr" typeface="Myanmar Text"/>
-        <a:font script="Nkoo" typeface="Ebrima"/>
-        <a:font script="Olck" typeface="Nirmala UI"/>
-        <a:font script="Osma" typeface="Ebrima"/>
-        <a:font script="Phag" typeface="Phagspa"/>
-        <a:font script="Syrn" typeface="Estrangelo Edessa"/>
-        <a:font script="Syrj" typeface="Estrangelo Edessa"/>
-        <a:font script="Syre" typeface="Estrangelo Edessa"/>
-        <a:font script="Sora" typeface="Nirmala UI"/>
-        <a:font script="Tale" typeface="Microsoft Tai Le"/>
-        <a:font script="Talu" typeface="Microsoft New Tai Lue"/>
-        <a:font script="Tfng" typeface="Ebrima"/>
       </a:majorFont>
       <a:minorFont>
         <a:latin typeface="Calibri" panose="020F0502020204030204"/>
@@ -3512,26 +3532,9 @@
         <a:font script="Viet" typeface="Arial"/>
         <a:font script="Uigh" typeface="Microsoft Uighur"/>
         <a:font script="Geor" typeface="Sylfaen"/>
-        <a:font script="Armn" typeface="Arial"/>
-        <a:font script="Bugi" typeface="Leelawadee UI"/>
-        <a:font script="Bopo" typeface="Microsoft JhengHei"/>
-        <a:font script="Java" typeface="Javanese Text"/>
-        <a:font script="Lisu" typeface="Segoe UI"/>
-        <a:font script="Mymr" typeface="Myanmar Text"/>
-        <a:font script="Nkoo" typeface="Ebrima"/>
-        <a:font script="Olck" typeface="Nirmala UI"/>
-        <a:font script="Osma" typeface="Ebrima"/>
-        <a:font script="Phag" typeface="Phagspa"/>
-        <a:font script="Syrn" typeface="Estrangelo Edessa"/>
-        <a:font script="Syrj" typeface="Estrangelo Edessa"/>
-        <a:font script="Syre" typeface="Estrangelo Edessa"/>
-        <a:font script="Sora" typeface="Nirmala UI"/>
-        <a:font script="Tale" typeface="Microsoft Tai Le"/>
-        <a:font script="Talu" typeface="Microsoft New Tai Lue"/>
-        <a:font script="Tfng" typeface="Ebrima"/>
       </a:minorFont>
     </a:fontScheme>
-    <a:fmtScheme name="Office">
+    <a:fmtScheme name="Office Theme">
       <a:fillStyleLst>
         <a:solidFill>
           <a:schemeClr val="phClr"/>
@@ -3673,7 +3676,7 @@
   <a:extraClrSchemeLst/>
   <a:extLst>
     <a:ext uri="{05A4C25C-085E-4340-85A3-A5531E510DB2}">
-      <thm15:themeFamily xmlns:thm15="http://schemas.microsoft.com/office/thememl/2012/main" name="Office Theme" id="{62F939B6-93AF-4DB8-9C6B-D6C7DFDC589F}" vid="{4A3C46E8-61CC-4603-A589-7422A47A8E4A}"/>
+      <thm15:themeFamily xmlns:thm15="http://schemas.microsoft.com/office/thememl/2012/main" name="Office Theme 2013 - 2022" id="{62F939B6-93AF-4DB8-9C6B-D6C7DFDC589F}" vid="{4A3C46E8-61CC-4603-A589-7422A47A8E4A}"/>
     </a:ext>
   </a:extLst>
 </a:theme>

</xml_diff>